<commit_message>
Dokumente für Task  12 und Task 13
</commit_message>
<xml_diff>
--- a/ch.bfh.bti7081.s2013.green/doc/task13/Task13_Präsentation.pptx
+++ b/ch.bfh.bti7081.s2013.green/doc/task13/Task13_Präsentation.pptx
@@ -8,7 +8,14 @@
     <p:sldId id="256" r:id="rId2"/>
     <p:sldId id="278" r:id="rId3"/>
     <p:sldId id="280" r:id="rId4"/>
-    <p:sldId id="281" r:id="rId5"/>
+    <p:sldId id="282" r:id="rId5"/>
+    <p:sldId id="283" r:id="rId6"/>
+    <p:sldId id="284" r:id="rId7"/>
+    <p:sldId id="285" r:id="rId8"/>
+    <p:sldId id="286" r:id="rId9"/>
+    <p:sldId id="288" r:id="rId10"/>
+    <p:sldId id="289" r:id="rId11"/>
+    <p:sldId id="290" r:id="rId12"/>
   </p:sldIdLst>
   <p:sldSz cx="12192000" cy="6858000"/>
   <p:notesSz cx="6858000" cy="9144000"/>
@@ -6388,6 +6395,1494 @@
 </p:sld>
 </file>
 
+<file path=ppt/slides/slide10.xml><?xml version="1.0" encoding="utf-8"?>
+<p:sld xmlns:a="http://schemas.openxmlformats.org/drawingml/2006/main" xmlns:r="http://schemas.openxmlformats.org/officeDocument/2006/relationships" xmlns:p="http://schemas.openxmlformats.org/presentationml/2006/main">
+  <p:cSld>
+    <p:spTree>
+      <p:nvGrpSpPr>
+        <p:cNvPr id="1" name=""/>
+        <p:cNvGrpSpPr/>
+        <p:nvPr/>
+      </p:nvGrpSpPr>
+      <p:grpSpPr>
+        <a:xfrm>
+          <a:off x="0" y="0"/>
+          <a:ext cx="0" cy="0"/>
+          <a:chOff x="0" y="0"/>
+          <a:chExt cx="0" cy="0"/>
+        </a:xfrm>
+      </p:grpSpPr>
+      <p:sp>
+        <p:nvSpPr>
+          <p:cNvPr id="2" name="Titel 1"/>
+          <p:cNvSpPr>
+            <a:spLocks noGrp="1"/>
+          </p:cNvSpPr>
+          <p:nvPr>
+            <p:ph type="title"/>
+          </p:nvPr>
+        </p:nvSpPr>
+        <p:spPr>
+          <a:xfrm>
+            <a:off x="677334" y="640772"/>
+            <a:ext cx="8596668" cy="1320800"/>
+          </a:xfrm>
+        </p:spPr>
+        <p:txBody>
+          <a:bodyPr/>
+          <a:lstStyle/>
+          <a:p>
+            <a:r>
+              <a:rPr lang="de-CH" dirty="0" smtClean="0"/>
+              <a:t>Konkrete Beilage</a:t>
+            </a:r>
+            <a:br>
+              <a:rPr lang="de-CH" dirty="0" smtClean="0"/>
+            </a:br>
+            <a:endParaRPr lang="de-CH" dirty="0"/>
+          </a:p>
+        </p:txBody>
+      </p:sp>
+      <p:sp>
+        <p:nvSpPr>
+          <p:cNvPr id="3" name="Inhaltsplatzhalter 2"/>
+          <p:cNvSpPr>
+            <a:spLocks noGrp="1"/>
+          </p:cNvSpPr>
+          <p:nvPr>
+            <p:ph idx="1"/>
+          </p:nvPr>
+        </p:nvSpPr>
+        <p:spPr>
+          <a:xfrm>
+            <a:off x="677334" y="1454727"/>
+            <a:ext cx="8596668" cy="5288973"/>
+          </a:xfrm>
+        </p:spPr>
+        <p:txBody>
+          <a:bodyPr>
+            <a:normAutofit fontScale="85000" lnSpcReduction="20000"/>
+          </a:bodyPr>
+          <a:lstStyle/>
+          <a:p>
+            <a:pPr marL="0" indent="0">
+              <a:buNone/>
+            </a:pPr>
+            <a:r>
+              <a:rPr lang="de-CH" dirty="0" err="1">
+                <a:latin typeface="Courier New" pitchFamily="49" charset="0"/>
+                <a:cs typeface="Courier New" pitchFamily="49" charset="0"/>
+              </a:rPr>
+              <a:t>class</a:t>
+            </a:r>
+            <a:r>
+              <a:rPr lang="de-CH" dirty="0">
+                <a:latin typeface="Courier New" pitchFamily="49" charset="0"/>
+                <a:cs typeface="Courier New" pitchFamily="49" charset="0"/>
+              </a:rPr>
+              <a:t> Pommes </a:t>
+            </a:r>
+            <a:r>
+              <a:rPr lang="de-CH" dirty="0" err="1">
+                <a:latin typeface="Courier New" pitchFamily="49" charset="0"/>
+                <a:cs typeface="Courier New" pitchFamily="49" charset="0"/>
+              </a:rPr>
+              <a:t>extends</a:t>
+            </a:r>
+            <a:r>
+              <a:rPr lang="de-CH" dirty="0">
+                <a:latin typeface="Courier New" pitchFamily="49" charset="0"/>
+                <a:cs typeface="Courier New" pitchFamily="49" charset="0"/>
+              </a:rPr>
+              <a:t> </a:t>
+            </a:r>
+            <a:r>
+              <a:rPr lang="de-CH" dirty="0" err="1">
+                <a:latin typeface="Courier New" pitchFamily="49" charset="0"/>
+                <a:cs typeface="Courier New" pitchFamily="49" charset="0"/>
+              </a:rPr>
+              <a:t>ABeilage</a:t>
+            </a:r>
+            <a:r>
+              <a:rPr lang="de-CH" dirty="0">
+                <a:latin typeface="Courier New" pitchFamily="49" charset="0"/>
+                <a:cs typeface="Courier New" pitchFamily="49" charset="0"/>
+              </a:rPr>
+              <a:t> { </a:t>
+            </a:r>
+            <a:br>
+              <a:rPr lang="de-CH" dirty="0">
+                <a:latin typeface="Courier New" pitchFamily="49" charset="0"/>
+                <a:cs typeface="Courier New" pitchFamily="49" charset="0"/>
+              </a:rPr>
+            </a:br>
+            <a:r>
+              <a:rPr lang="de-CH" dirty="0">
+                <a:latin typeface="Courier New" pitchFamily="49" charset="0"/>
+                <a:cs typeface="Courier New" pitchFamily="49" charset="0"/>
+              </a:rPr>
+              <a:t>    </a:t>
+            </a:r>
+            <a:r>
+              <a:rPr lang="de-CH" dirty="0" err="1">
+                <a:latin typeface="Courier New" pitchFamily="49" charset="0"/>
+                <a:cs typeface="Courier New" pitchFamily="49" charset="0"/>
+              </a:rPr>
+              <a:t>public</a:t>
+            </a:r>
+            <a:r>
+              <a:rPr lang="de-CH" dirty="0">
+                <a:latin typeface="Courier New" pitchFamily="49" charset="0"/>
+                <a:cs typeface="Courier New" pitchFamily="49" charset="0"/>
+              </a:rPr>
+              <a:t> Pommes(</a:t>
+            </a:r>
+            <a:r>
+              <a:rPr lang="de-CH" dirty="0" err="1">
+                <a:latin typeface="Courier New" pitchFamily="49" charset="0"/>
+                <a:cs typeface="Courier New" pitchFamily="49" charset="0"/>
+              </a:rPr>
+              <a:t>IGericht</a:t>
+            </a:r>
+            <a:r>
+              <a:rPr lang="de-CH" dirty="0">
+                <a:latin typeface="Courier New" pitchFamily="49" charset="0"/>
+                <a:cs typeface="Courier New" pitchFamily="49" charset="0"/>
+              </a:rPr>
+              <a:t> </a:t>
+            </a:r>
+            <a:r>
+              <a:rPr lang="de-CH" dirty="0" err="1">
+                <a:latin typeface="Courier New" pitchFamily="49" charset="0"/>
+                <a:cs typeface="Courier New" pitchFamily="49" charset="0"/>
+              </a:rPr>
+              <a:t>pIGericht</a:t>
+            </a:r>
+            <a:r>
+              <a:rPr lang="de-CH" dirty="0">
+                <a:latin typeface="Courier New" pitchFamily="49" charset="0"/>
+                <a:cs typeface="Courier New" pitchFamily="49" charset="0"/>
+              </a:rPr>
+              <a:t>) { </a:t>
+            </a:r>
+            <a:br>
+              <a:rPr lang="de-CH" dirty="0">
+                <a:latin typeface="Courier New" pitchFamily="49" charset="0"/>
+                <a:cs typeface="Courier New" pitchFamily="49" charset="0"/>
+              </a:rPr>
+            </a:br>
+            <a:r>
+              <a:rPr lang="de-CH" dirty="0">
+                <a:latin typeface="Courier New" pitchFamily="49" charset="0"/>
+                <a:cs typeface="Courier New" pitchFamily="49" charset="0"/>
+              </a:rPr>
+              <a:t>        super(</a:t>
+            </a:r>
+            <a:r>
+              <a:rPr lang="de-CH" dirty="0" err="1">
+                <a:latin typeface="Courier New" pitchFamily="49" charset="0"/>
+                <a:cs typeface="Courier New" pitchFamily="49" charset="0"/>
+              </a:rPr>
+              <a:t>pIGericht</a:t>
+            </a:r>
+            <a:r>
+              <a:rPr lang="de-CH" dirty="0">
+                <a:latin typeface="Courier New" pitchFamily="49" charset="0"/>
+                <a:cs typeface="Courier New" pitchFamily="49" charset="0"/>
+              </a:rPr>
+              <a:t>); </a:t>
+            </a:r>
+            <a:br>
+              <a:rPr lang="de-CH" dirty="0">
+                <a:latin typeface="Courier New" pitchFamily="49" charset="0"/>
+                <a:cs typeface="Courier New" pitchFamily="49" charset="0"/>
+              </a:rPr>
+            </a:br>
+            <a:r>
+              <a:rPr lang="de-CH" dirty="0">
+                <a:latin typeface="Courier New" pitchFamily="49" charset="0"/>
+                <a:cs typeface="Courier New" pitchFamily="49" charset="0"/>
+              </a:rPr>
+              <a:t>    } </a:t>
+            </a:r>
+            <a:br>
+              <a:rPr lang="de-CH" dirty="0">
+                <a:latin typeface="Courier New" pitchFamily="49" charset="0"/>
+                <a:cs typeface="Courier New" pitchFamily="49" charset="0"/>
+              </a:rPr>
+            </a:br>
+            <a:r>
+              <a:rPr lang="de-CH" dirty="0">
+                <a:latin typeface="Courier New" pitchFamily="49" charset="0"/>
+                <a:cs typeface="Courier New" pitchFamily="49" charset="0"/>
+              </a:rPr>
+              <a:t>    </a:t>
+            </a:r>
+            <a:r>
+              <a:rPr lang="de-CH" dirty="0" err="1">
+                <a:latin typeface="Courier New" pitchFamily="49" charset="0"/>
+                <a:cs typeface="Courier New" pitchFamily="49" charset="0"/>
+              </a:rPr>
+              <a:t>public</a:t>
+            </a:r>
+            <a:r>
+              <a:rPr lang="de-CH" dirty="0">
+                <a:latin typeface="Courier New" pitchFamily="49" charset="0"/>
+                <a:cs typeface="Courier New" pitchFamily="49" charset="0"/>
+              </a:rPr>
+              <a:t> </a:t>
+            </a:r>
+            <a:r>
+              <a:rPr lang="de-CH" dirty="0" err="1">
+                <a:latin typeface="Courier New" pitchFamily="49" charset="0"/>
+                <a:cs typeface="Courier New" pitchFamily="49" charset="0"/>
+              </a:rPr>
+              <a:t>void</a:t>
+            </a:r>
+            <a:r>
+              <a:rPr lang="de-CH" dirty="0">
+                <a:latin typeface="Courier New" pitchFamily="49" charset="0"/>
+                <a:cs typeface="Courier New" pitchFamily="49" charset="0"/>
+              </a:rPr>
+              <a:t> </a:t>
+            </a:r>
+            <a:r>
+              <a:rPr lang="de-CH" dirty="0" err="1">
+                <a:latin typeface="Courier New" pitchFamily="49" charset="0"/>
+                <a:cs typeface="Courier New" pitchFamily="49" charset="0"/>
+              </a:rPr>
+              <a:t>druckeBeschreibung</a:t>
+            </a:r>
+            <a:r>
+              <a:rPr lang="de-CH" dirty="0">
+                <a:latin typeface="Courier New" pitchFamily="49" charset="0"/>
+                <a:cs typeface="Courier New" pitchFamily="49" charset="0"/>
+              </a:rPr>
+              <a:t>() { </a:t>
+            </a:r>
+            <a:br>
+              <a:rPr lang="de-CH" dirty="0">
+                <a:latin typeface="Courier New" pitchFamily="49" charset="0"/>
+                <a:cs typeface="Courier New" pitchFamily="49" charset="0"/>
+              </a:rPr>
+            </a:br>
+            <a:r>
+              <a:rPr lang="de-CH" dirty="0">
+                <a:latin typeface="Courier New" pitchFamily="49" charset="0"/>
+                <a:cs typeface="Courier New" pitchFamily="49" charset="0"/>
+              </a:rPr>
+              <a:t>        </a:t>
+            </a:r>
+            <a:r>
+              <a:rPr lang="de-CH" dirty="0" err="1">
+                <a:latin typeface="Courier New" pitchFamily="49" charset="0"/>
+                <a:cs typeface="Courier New" pitchFamily="49" charset="0"/>
+              </a:rPr>
+              <a:t>gericht.druckeBeschreibung</a:t>
+            </a:r>
+            <a:r>
+              <a:rPr lang="de-CH" dirty="0">
+                <a:latin typeface="Courier New" pitchFamily="49" charset="0"/>
+                <a:cs typeface="Courier New" pitchFamily="49" charset="0"/>
+              </a:rPr>
+              <a:t>(); </a:t>
+            </a:r>
+            <a:br>
+              <a:rPr lang="de-CH" dirty="0">
+                <a:latin typeface="Courier New" pitchFamily="49" charset="0"/>
+                <a:cs typeface="Courier New" pitchFamily="49" charset="0"/>
+              </a:rPr>
+            </a:br>
+            <a:r>
+              <a:rPr lang="de-CH" dirty="0">
+                <a:latin typeface="Courier New" pitchFamily="49" charset="0"/>
+                <a:cs typeface="Courier New" pitchFamily="49" charset="0"/>
+              </a:rPr>
+              <a:t>        </a:t>
+            </a:r>
+            <a:r>
+              <a:rPr lang="de-CH" dirty="0" err="1">
+                <a:latin typeface="Courier New" pitchFamily="49" charset="0"/>
+                <a:cs typeface="Courier New" pitchFamily="49" charset="0"/>
+              </a:rPr>
+              <a:t>System.out.print</a:t>
+            </a:r>
+            <a:r>
+              <a:rPr lang="de-CH" dirty="0">
+                <a:latin typeface="Courier New" pitchFamily="49" charset="0"/>
+                <a:cs typeface="Courier New" pitchFamily="49" charset="0"/>
+              </a:rPr>
+              <a:t>(", Pommes"); </a:t>
+            </a:r>
+            <a:br>
+              <a:rPr lang="de-CH" dirty="0">
+                <a:latin typeface="Courier New" pitchFamily="49" charset="0"/>
+                <a:cs typeface="Courier New" pitchFamily="49" charset="0"/>
+              </a:rPr>
+            </a:br>
+            <a:r>
+              <a:rPr lang="de-CH" dirty="0">
+                <a:latin typeface="Courier New" pitchFamily="49" charset="0"/>
+                <a:cs typeface="Courier New" pitchFamily="49" charset="0"/>
+              </a:rPr>
+              <a:t>    } </a:t>
+            </a:r>
+            <a:br>
+              <a:rPr lang="de-CH" dirty="0">
+                <a:latin typeface="Courier New" pitchFamily="49" charset="0"/>
+                <a:cs typeface="Courier New" pitchFamily="49" charset="0"/>
+              </a:rPr>
+            </a:br>
+            <a:r>
+              <a:rPr lang="de-CH" dirty="0">
+                <a:latin typeface="Courier New" pitchFamily="49" charset="0"/>
+                <a:cs typeface="Courier New" pitchFamily="49" charset="0"/>
+              </a:rPr>
+              <a:t>    </a:t>
+            </a:r>
+            <a:r>
+              <a:rPr lang="de-CH" dirty="0" err="1">
+                <a:latin typeface="Courier New" pitchFamily="49" charset="0"/>
+                <a:cs typeface="Courier New" pitchFamily="49" charset="0"/>
+              </a:rPr>
+              <a:t>public</a:t>
+            </a:r>
+            <a:r>
+              <a:rPr lang="de-CH" dirty="0">
+                <a:latin typeface="Courier New" pitchFamily="49" charset="0"/>
+                <a:cs typeface="Courier New" pitchFamily="49" charset="0"/>
+              </a:rPr>
+              <a:t> double </a:t>
+            </a:r>
+            <a:r>
+              <a:rPr lang="de-CH" dirty="0" err="1">
+                <a:latin typeface="Courier New" pitchFamily="49" charset="0"/>
+                <a:cs typeface="Courier New" pitchFamily="49" charset="0"/>
+              </a:rPr>
+              <a:t>getPreis</a:t>
+            </a:r>
+            <a:r>
+              <a:rPr lang="de-CH" dirty="0">
+                <a:latin typeface="Courier New" pitchFamily="49" charset="0"/>
+                <a:cs typeface="Courier New" pitchFamily="49" charset="0"/>
+              </a:rPr>
+              <a:t>() { </a:t>
+            </a:r>
+            <a:br>
+              <a:rPr lang="de-CH" dirty="0">
+                <a:latin typeface="Courier New" pitchFamily="49" charset="0"/>
+                <a:cs typeface="Courier New" pitchFamily="49" charset="0"/>
+              </a:rPr>
+            </a:br>
+            <a:r>
+              <a:rPr lang="de-CH" dirty="0">
+                <a:latin typeface="Courier New" pitchFamily="49" charset="0"/>
+                <a:cs typeface="Courier New" pitchFamily="49" charset="0"/>
+              </a:rPr>
+              <a:t>        </a:t>
+            </a:r>
+            <a:r>
+              <a:rPr lang="de-CH" dirty="0" err="1">
+                <a:latin typeface="Courier New" pitchFamily="49" charset="0"/>
+                <a:cs typeface="Courier New" pitchFamily="49" charset="0"/>
+              </a:rPr>
+              <a:t>return</a:t>
+            </a:r>
+            <a:r>
+              <a:rPr lang="de-CH" dirty="0">
+                <a:latin typeface="Courier New" pitchFamily="49" charset="0"/>
+                <a:cs typeface="Courier New" pitchFamily="49" charset="0"/>
+              </a:rPr>
+              <a:t> </a:t>
+            </a:r>
+            <a:r>
+              <a:rPr lang="de-CH" dirty="0" err="1">
+                <a:latin typeface="Courier New" pitchFamily="49" charset="0"/>
+                <a:cs typeface="Courier New" pitchFamily="49" charset="0"/>
+              </a:rPr>
+              <a:t>gericht.getPreis</a:t>
+            </a:r>
+            <a:r>
+              <a:rPr lang="de-CH" dirty="0">
+                <a:latin typeface="Courier New" pitchFamily="49" charset="0"/>
+                <a:cs typeface="Courier New" pitchFamily="49" charset="0"/>
+              </a:rPr>
+              <a:t>() + 2.50; </a:t>
+            </a:r>
+            <a:br>
+              <a:rPr lang="de-CH" dirty="0">
+                <a:latin typeface="Courier New" pitchFamily="49" charset="0"/>
+                <a:cs typeface="Courier New" pitchFamily="49" charset="0"/>
+              </a:rPr>
+            </a:br>
+            <a:r>
+              <a:rPr lang="de-CH" dirty="0">
+                <a:latin typeface="Courier New" pitchFamily="49" charset="0"/>
+                <a:cs typeface="Courier New" pitchFamily="49" charset="0"/>
+              </a:rPr>
+              <a:t>    } </a:t>
+            </a:r>
+            <a:br>
+              <a:rPr lang="de-CH" dirty="0">
+                <a:latin typeface="Courier New" pitchFamily="49" charset="0"/>
+                <a:cs typeface="Courier New" pitchFamily="49" charset="0"/>
+              </a:rPr>
+            </a:br>
+            <a:r>
+              <a:rPr lang="de-CH" dirty="0">
+                <a:latin typeface="Courier New" pitchFamily="49" charset="0"/>
+                <a:cs typeface="Courier New" pitchFamily="49" charset="0"/>
+              </a:rPr>
+              <a:t>} </a:t>
+            </a:r>
+            <a:br>
+              <a:rPr lang="de-CH" dirty="0">
+                <a:latin typeface="Courier New" pitchFamily="49" charset="0"/>
+                <a:cs typeface="Courier New" pitchFamily="49" charset="0"/>
+              </a:rPr>
+            </a:br>
+            <a:r>
+              <a:rPr lang="de-CH" dirty="0">
+                <a:latin typeface="Courier New" pitchFamily="49" charset="0"/>
+                <a:cs typeface="Courier New" pitchFamily="49" charset="0"/>
+              </a:rPr>
+              <a:t/>
+            </a:r>
+            <a:br>
+              <a:rPr lang="de-CH" dirty="0">
+                <a:latin typeface="Courier New" pitchFamily="49" charset="0"/>
+                <a:cs typeface="Courier New" pitchFamily="49" charset="0"/>
+              </a:rPr>
+            </a:br>
+            <a:r>
+              <a:rPr lang="de-CH" dirty="0">
+                <a:latin typeface="Courier New" pitchFamily="49" charset="0"/>
+                <a:cs typeface="Courier New" pitchFamily="49" charset="0"/>
+              </a:rPr>
+              <a:t/>
+            </a:r>
+            <a:br>
+              <a:rPr lang="de-CH" dirty="0">
+                <a:latin typeface="Courier New" pitchFamily="49" charset="0"/>
+                <a:cs typeface="Courier New" pitchFamily="49" charset="0"/>
+              </a:rPr>
+            </a:br>
+            <a:r>
+              <a:rPr lang="de-CH" dirty="0" err="1">
+                <a:latin typeface="Courier New" pitchFamily="49" charset="0"/>
+                <a:cs typeface="Courier New" pitchFamily="49" charset="0"/>
+              </a:rPr>
+              <a:t>class</a:t>
+            </a:r>
+            <a:r>
+              <a:rPr lang="de-CH" dirty="0">
+                <a:latin typeface="Courier New" pitchFamily="49" charset="0"/>
+                <a:cs typeface="Courier New" pitchFamily="49" charset="0"/>
+              </a:rPr>
+              <a:t> Salat </a:t>
+            </a:r>
+            <a:r>
+              <a:rPr lang="de-CH" dirty="0" err="1">
+                <a:latin typeface="Courier New" pitchFamily="49" charset="0"/>
+                <a:cs typeface="Courier New" pitchFamily="49" charset="0"/>
+              </a:rPr>
+              <a:t>extends</a:t>
+            </a:r>
+            <a:r>
+              <a:rPr lang="de-CH" dirty="0">
+                <a:latin typeface="Courier New" pitchFamily="49" charset="0"/>
+                <a:cs typeface="Courier New" pitchFamily="49" charset="0"/>
+              </a:rPr>
+              <a:t> </a:t>
+            </a:r>
+            <a:r>
+              <a:rPr lang="de-CH" dirty="0" err="1">
+                <a:latin typeface="Courier New" pitchFamily="49" charset="0"/>
+                <a:cs typeface="Courier New" pitchFamily="49" charset="0"/>
+              </a:rPr>
+              <a:t>ABeilage</a:t>
+            </a:r>
+            <a:r>
+              <a:rPr lang="de-CH" dirty="0">
+                <a:latin typeface="Courier New" pitchFamily="49" charset="0"/>
+                <a:cs typeface="Courier New" pitchFamily="49" charset="0"/>
+              </a:rPr>
+              <a:t> { </a:t>
+            </a:r>
+            <a:br>
+              <a:rPr lang="de-CH" dirty="0">
+                <a:latin typeface="Courier New" pitchFamily="49" charset="0"/>
+                <a:cs typeface="Courier New" pitchFamily="49" charset="0"/>
+              </a:rPr>
+            </a:br>
+            <a:r>
+              <a:rPr lang="de-CH" dirty="0">
+                <a:latin typeface="Courier New" pitchFamily="49" charset="0"/>
+                <a:cs typeface="Courier New" pitchFamily="49" charset="0"/>
+              </a:rPr>
+              <a:t>    </a:t>
+            </a:r>
+            <a:r>
+              <a:rPr lang="de-CH" dirty="0" err="1">
+                <a:latin typeface="Courier New" pitchFamily="49" charset="0"/>
+                <a:cs typeface="Courier New" pitchFamily="49" charset="0"/>
+              </a:rPr>
+              <a:t>public</a:t>
+            </a:r>
+            <a:r>
+              <a:rPr lang="de-CH" dirty="0">
+                <a:latin typeface="Courier New" pitchFamily="49" charset="0"/>
+                <a:cs typeface="Courier New" pitchFamily="49" charset="0"/>
+              </a:rPr>
+              <a:t> Salat(</a:t>
+            </a:r>
+            <a:r>
+              <a:rPr lang="de-CH" dirty="0" err="1">
+                <a:latin typeface="Courier New" pitchFamily="49" charset="0"/>
+                <a:cs typeface="Courier New" pitchFamily="49" charset="0"/>
+              </a:rPr>
+              <a:t>IGericht</a:t>
+            </a:r>
+            <a:r>
+              <a:rPr lang="de-CH" dirty="0">
+                <a:latin typeface="Courier New" pitchFamily="49" charset="0"/>
+                <a:cs typeface="Courier New" pitchFamily="49" charset="0"/>
+              </a:rPr>
+              <a:t> </a:t>
+            </a:r>
+            <a:r>
+              <a:rPr lang="de-CH" dirty="0" err="1">
+                <a:latin typeface="Courier New" pitchFamily="49" charset="0"/>
+                <a:cs typeface="Courier New" pitchFamily="49" charset="0"/>
+              </a:rPr>
+              <a:t>pIGericht</a:t>
+            </a:r>
+            <a:r>
+              <a:rPr lang="de-CH" dirty="0">
+                <a:latin typeface="Courier New" pitchFamily="49" charset="0"/>
+                <a:cs typeface="Courier New" pitchFamily="49" charset="0"/>
+              </a:rPr>
+              <a:t>) { </a:t>
+            </a:r>
+            <a:br>
+              <a:rPr lang="de-CH" dirty="0">
+                <a:latin typeface="Courier New" pitchFamily="49" charset="0"/>
+                <a:cs typeface="Courier New" pitchFamily="49" charset="0"/>
+              </a:rPr>
+            </a:br>
+            <a:r>
+              <a:rPr lang="de-CH" dirty="0">
+                <a:latin typeface="Courier New" pitchFamily="49" charset="0"/>
+                <a:cs typeface="Courier New" pitchFamily="49" charset="0"/>
+              </a:rPr>
+              <a:t>        super(</a:t>
+            </a:r>
+            <a:r>
+              <a:rPr lang="de-CH" dirty="0" err="1">
+                <a:latin typeface="Courier New" pitchFamily="49" charset="0"/>
+                <a:cs typeface="Courier New" pitchFamily="49" charset="0"/>
+              </a:rPr>
+              <a:t>pIGericht</a:t>
+            </a:r>
+            <a:r>
+              <a:rPr lang="de-CH" dirty="0">
+                <a:latin typeface="Courier New" pitchFamily="49" charset="0"/>
+                <a:cs typeface="Courier New" pitchFamily="49" charset="0"/>
+              </a:rPr>
+              <a:t>); </a:t>
+            </a:r>
+            <a:br>
+              <a:rPr lang="de-CH" dirty="0">
+                <a:latin typeface="Courier New" pitchFamily="49" charset="0"/>
+                <a:cs typeface="Courier New" pitchFamily="49" charset="0"/>
+              </a:rPr>
+            </a:br>
+            <a:r>
+              <a:rPr lang="de-CH" dirty="0">
+                <a:latin typeface="Courier New" pitchFamily="49" charset="0"/>
+                <a:cs typeface="Courier New" pitchFamily="49" charset="0"/>
+              </a:rPr>
+              <a:t>    } </a:t>
+            </a:r>
+            <a:br>
+              <a:rPr lang="de-CH" dirty="0">
+                <a:latin typeface="Courier New" pitchFamily="49" charset="0"/>
+                <a:cs typeface="Courier New" pitchFamily="49" charset="0"/>
+              </a:rPr>
+            </a:br>
+            <a:r>
+              <a:rPr lang="de-CH" dirty="0">
+                <a:latin typeface="Courier New" pitchFamily="49" charset="0"/>
+                <a:cs typeface="Courier New" pitchFamily="49" charset="0"/>
+              </a:rPr>
+              <a:t>    </a:t>
+            </a:r>
+            <a:r>
+              <a:rPr lang="de-CH" dirty="0" err="1">
+                <a:latin typeface="Courier New" pitchFamily="49" charset="0"/>
+                <a:cs typeface="Courier New" pitchFamily="49" charset="0"/>
+              </a:rPr>
+              <a:t>public</a:t>
+            </a:r>
+            <a:r>
+              <a:rPr lang="de-CH" dirty="0">
+                <a:latin typeface="Courier New" pitchFamily="49" charset="0"/>
+                <a:cs typeface="Courier New" pitchFamily="49" charset="0"/>
+              </a:rPr>
+              <a:t> </a:t>
+            </a:r>
+            <a:r>
+              <a:rPr lang="de-CH" dirty="0" err="1">
+                <a:latin typeface="Courier New" pitchFamily="49" charset="0"/>
+                <a:cs typeface="Courier New" pitchFamily="49" charset="0"/>
+              </a:rPr>
+              <a:t>void</a:t>
+            </a:r>
+            <a:r>
+              <a:rPr lang="de-CH" dirty="0">
+                <a:latin typeface="Courier New" pitchFamily="49" charset="0"/>
+                <a:cs typeface="Courier New" pitchFamily="49" charset="0"/>
+              </a:rPr>
+              <a:t> </a:t>
+            </a:r>
+            <a:r>
+              <a:rPr lang="de-CH" dirty="0" err="1">
+                <a:latin typeface="Courier New" pitchFamily="49" charset="0"/>
+                <a:cs typeface="Courier New" pitchFamily="49" charset="0"/>
+              </a:rPr>
+              <a:t>druckeBeschreibung</a:t>
+            </a:r>
+            <a:r>
+              <a:rPr lang="de-CH" dirty="0">
+                <a:latin typeface="Courier New" pitchFamily="49" charset="0"/>
+                <a:cs typeface="Courier New" pitchFamily="49" charset="0"/>
+              </a:rPr>
+              <a:t>() { </a:t>
+            </a:r>
+            <a:br>
+              <a:rPr lang="de-CH" dirty="0">
+                <a:latin typeface="Courier New" pitchFamily="49" charset="0"/>
+                <a:cs typeface="Courier New" pitchFamily="49" charset="0"/>
+              </a:rPr>
+            </a:br>
+            <a:r>
+              <a:rPr lang="de-CH" dirty="0">
+                <a:latin typeface="Courier New" pitchFamily="49" charset="0"/>
+                <a:cs typeface="Courier New" pitchFamily="49" charset="0"/>
+              </a:rPr>
+              <a:t>        </a:t>
+            </a:r>
+            <a:r>
+              <a:rPr lang="de-CH" dirty="0" err="1">
+                <a:latin typeface="Courier New" pitchFamily="49" charset="0"/>
+                <a:cs typeface="Courier New" pitchFamily="49" charset="0"/>
+              </a:rPr>
+              <a:t>gericht.druckeBeschreibung</a:t>
+            </a:r>
+            <a:r>
+              <a:rPr lang="de-CH" dirty="0">
+                <a:latin typeface="Courier New" pitchFamily="49" charset="0"/>
+                <a:cs typeface="Courier New" pitchFamily="49" charset="0"/>
+              </a:rPr>
+              <a:t>(); </a:t>
+            </a:r>
+            <a:br>
+              <a:rPr lang="de-CH" dirty="0">
+                <a:latin typeface="Courier New" pitchFamily="49" charset="0"/>
+                <a:cs typeface="Courier New" pitchFamily="49" charset="0"/>
+              </a:rPr>
+            </a:br>
+            <a:r>
+              <a:rPr lang="de-CH" dirty="0">
+                <a:latin typeface="Courier New" pitchFamily="49" charset="0"/>
+                <a:cs typeface="Courier New" pitchFamily="49" charset="0"/>
+              </a:rPr>
+              <a:t>        </a:t>
+            </a:r>
+            <a:r>
+              <a:rPr lang="de-CH" dirty="0" err="1">
+                <a:latin typeface="Courier New" pitchFamily="49" charset="0"/>
+                <a:cs typeface="Courier New" pitchFamily="49" charset="0"/>
+              </a:rPr>
+              <a:t>System.out.print</a:t>
+            </a:r>
+            <a:r>
+              <a:rPr lang="de-CH" dirty="0">
+                <a:latin typeface="Courier New" pitchFamily="49" charset="0"/>
+                <a:cs typeface="Courier New" pitchFamily="49" charset="0"/>
+              </a:rPr>
+              <a:t>(", Salat"); </a:t>
+            </a:r>
+            <a:br>
+              <a:rPr lang="de-CH" dirty="0">
+                <a:latin typeface="Courier New" pitchFamily="49" charset="0"/>
+                <a:cs typeface="Courier New" pitchFamily="49" charset="0"/>
+              </a:rPr>
+            </a:br>
+            <a:r>
+              <a:rPr lang="de-CH" dirty="0">
+                <a:latin typeface="Courier New" pitchFamily="49" charset="0"/>
+                <a:cs typeface="Courier New" pitchFamily="49" charset="0"/>
+              </a:rPr>
+              <a:t>    } </a:t>
+            </a:r>
+            <a:br>
+              <a:rPr lang="de-CH" dirty="0">
+                <a:latin typeface="Courier New" pitchFamily="49" charset="0"/>
+                <a:cs typeface="Courier New" pitchFamily="49" charset="0"/>
+              </a:rPr>
+            </a:br>
+            <a:r>
+              <a:rPr lang="de-CH" dirty="0">
+                <a:latin typeface="Courier New" pitchFamily="49" charset="0"/>
+                <a:cs typeface="Courier New" pitchFamily="49" charset="0"/>
+              </a:rPr>
+              <a:t>    </a:t>
+            </a:r>
+            <a:r>
+              <a:rPr lang="de-CH" dirty="0" err="1">
+                <a:latin typeface="Courier New" pitchFamily="49" charset="0"/>
+                <a:cs typeface="Courier New" pitchFamily="49" charset="0"/>
+              </a:rPr>
+              <a:t>public</a:t>
+            </a:r>
+            <a:r>
+              <a:rPr lang="de-CH" dirty="0">
+                <a:latin typeface="Courier New" pitchFamily="49" charset="0"/>
+                <a:cs typeface="Courier New" pitchFamily="49" charset="0"/>
+              </a:rPr>
+              <a:t> double </a:t>
+            </a:r>
+            <a:r>
+              <a:rPr lang="de-CH" dirty="0" err="1">
+                <a:latin typeface="Courier New" pitchFamily="49" charset="0"/>
+                <a:cs typeface="Courier New" pitchFamily="49" charset="0"/>
+              </a:rPr>
+              <a:t>getPreis</a:t>
+            </a:r>
+            <a:r>
+              <a:rPr lang="de-CH" dirty="0">
+                <a:latin typeface="Courier New" pitchFamily="49" charset="0"/>
+                <a:cs typeface="Courier New" pitchFamily="49" charset="0"/>
+              </a:rPr>
+              <a:t>() { </a:t>
+            </a:r>
+            <a:br>
+              <a:rPr lang="de-CH" dirty="0">
+                <a:latin typeface="Courier New" pitchFamily="49" charset="0"/>
+                <a:cs typeface="Courier New" pitchFamily="49" charset="0"/>
+              </a:rPr>
+            </a:br>
+            <a:r>
+              <a:rPr lang="de-CH" dirty="0">
+                <a:latin typeface="Courier New" pitchFamily="49" charset="0"/>
+                <a:cs typeface="Courier New" pitchFamily="49" charset="0"/>
+              </a:rPr>
+              <a:t>        </a:t>
+            </a:r>
+            <a:r>
+              <a:rPr lang="de-CH" dirty="0" err="1">
+                <a:latin typeface="Courier New" pitchFamily="49" charset="0"/>
+                <a:cs typeface="Courier New" pitchFamily="49" charset="0"/>
+              </a:rPr>
+              <a:t>return</a:t>
+            </a:r>
+            <a:r>
+              <a:rPr lang="de-CH" dirty="0">
+                <a:latin typeface="Courier New" pitchFamily="49" charset="0"/>
+                <a:cs typeface="Courier New" pitchFamily="49" charset="0"/>
+              </a:rPr>
+              <a:t> </a:t>
+            </a:r>
+            <a:r>
+              <a:rPr lang="de-CH" dirty="0" err="1">
+                <a:latin typeface="Courier New" pitchFamily="49" charset="0"/>
+                <a:cs typeface="Courier New" pitchFamily="49" charset="0"/>
+              </a:rPr>
+              <a:t>gericht.getPreis</a:t>
+            </a:r>
+            <a:r>
+              <a:rPr lang="de-CH" dirty="0">
+                <a:latin typeface="Courier New" pitchFamily="49" charset="0"/>
+                <a:cs typeface="Courier New" pitchFamily="49" charset="0"/>
+              </a:rPr>
+              <a:t>() + 2.25; </a:t>
+            </a:r>
+            <a:br>
+              <a:rPr lang="de-CH" dirty="0">
+                <a:latin typeface="Courier New" pitchFamily="49" charset="0"/>
+                <a:cs typeface="Courier New" pitchFamily="49" charset="0"/>
+              </a:rPr>
+            </a:br>
+            <a:r>
+              <a:rPr lang="de-CH" dirty="0">
+                <a:latin typeface="Courier New" pitchFamily="49" charset="0"/>
+                <a:cs typeface="Courier New" pitchFamily="49" charset="0"/>
+              </a:rPr>
+              <a:t>    } </a:t>
+            </a:r>
+            <a:br>
+              <a:rPr lang="de-CH" dirty="0">
+                <a:latin typeface="Courier New" pitchFamily="49" charset="0"/>
+                <a:cs typeface="Courier New" pitchFamily="49" charset="0"/>
+              </a:rPr>
+            </a:br>
+            <a:r>
+              <a:rPr lang="de-CH" dirty="0">
+                <a:latin typeface="Courier New" pitchFamily="49" charset="0"/>
+                <a:cs typeface="Courier New" pitchFamily="49" charset="0"/>
+              </a:rPr>
+              <a:t>} </a:t>
+            </a:r>
+            <a:endParaRPr lang="de-CH" dirty="0" smtClean="0">
+              <a:latin typeface="Courier New" pitchFamily="49" charset="0"/>
+              <a:cs typeface="Courier New" pitchFamily="49" charset="0"/>
+            </a:endParaRPr>
+          </a:p>
+        </p:txBody>
+      </p:sp>
+    </p:spTree>
+    <p:extLst>
+      <p:ext uri="{BB962C8B-B14F-4D97-AF65-F5344CB8AC3E}">
+        <p14:creationId xmlns:p14="http://schemas.microsoft.com/office/powerpoint/2010/main" val="3681103458"/>
+      </p:ext>
+    </p:extLst>
+  </p:cSld>
+  <p:clrMapOvr>
+    <a:masterClrMapping/>
+  </p:clrMapOvr>
+  <p:timing>
+    <p:tnLst>
+      <p:par>
+        <p:cTn id="1" dur="indefinite" restart="never" nodeType="tmRoot"/>
+      </p:par>
+    </p:tnLst>
+  </p:timing>
+</p:sld>
+</file>
+
+<file path=ppt/slides/slide11.xml><?xml version="1.0" encoding="utf-8"?>
+<p:sld xmlns:a="http://schemas.openxmlformats.org/drawingml/2006/main" xmlns:r="http://schemas.openxmlformats.org/officeDocument/2006/relationships" xmlns:p="http://schemas.openxmlformats.org/presentationml/2006/main">
+  <p:cSld>
+    <p:spTree>
+      <p:nvGrpSpPr>
+        <p:cNvPr id="1" name=""/>
+        <p:cNvGrpSpPr/>
+        <p:nvPr/>
+      </p:nvGrpSpPr>
+      <p:grpSpPr>
+        <a:xfrm>
+          <a:off x="0" y="0"/>
+          <a:ext cx="0" cy="0"/>
+          <a:chOff x="0" y="0"/>
+          <a:chExt cx="0" cy="0"/>
+        </a:xfrm>
+      </p:grpSpPr>
+      <p:sp>
+        <p:nvSpPr>
+          <p:cNvPr id="2" name="Titel 1"/>
+          <p:cNvSpPr>
+            <a:spLocks noGrp="1"/>
+          </p:cNvSpPr>
+          <p:nvPr>
+            <p:ph type="title"/>
+          </p:nvPr>
+        </p:nvSpPr>
+        <p:spPr>
+          <a:xfrm>
+            <a:off x="677334" y="640772"/>
+            <a:ext cx="8596668" cy="1320800"/>
+          </a:xfrm>
+        </p:spPr>
+        <p:txBody>
+          <a:bodyPr>
+            <a:normAutofit/>
+          </a:bodyPr>
+          <a:lstStyle/>
+          <a:p>
+            <a:r>
+              <a:rPr lang="de-CH" dirty="0" smtClean="0"/>
+              <a:t>Möglicher Client</a:t>
+            </a:r>
+            <a:br>
+              <a:rPr lang="de-CH" dirty="0" smtClean="0"/>
+            </a:br>
+            <a:endParaRPr lang="de-CH" dirty="0"/>
+          </a:p>
+        </p:txBody>
+      </p:sp>
+      <p:sp>
+        <p:nvSpPr>
+          <p:cNvPr id="3" name="Inhaltsplatzhalter 2"/>
+          <p:cNvSpPr>
+            <a:spLocks noGrp="1"/>
+          </p:cNvSpPr>
+          <p:nvPr>
+            <p:ph idx="1"/>
+          </p:nvPr>
+        </p:nvSpPr>
+        <p:spPr>
+          <a:xfrm>
+            <a:off x="677333" y="1454727"/>
+            <a:ext cx="9505757" cy="5288973"/>
+          </a:xfrm>
+        </p:spPr>
+        <p:txBody>
+          <a:bodyPr>
+            <a:normAutofit/>
+          </a:bodyPr>
+          <a:lstStyle/>
+          <a:p>
+            <a:pPr marL="0" indent="0">
+              <a:buNone/>
+            </a:pPr>
+            <a:r>
+              <a:rPr lang="de-CH" dirty="0">
+                <a:latin typeface="Courier New" pitchFamily="49" charset="0"/>
+                <a:cs typeface="Courier New" pitchFamily="49" charset="0"/>
+              </a:rPr>
+              <a:t>    </a:t>
+            </a:r>
+            <a:r>
+              <a:rPr lang="de-CH" dirty="0" err="1">
+                <a:latin typeface="Courier New" pitchFamily="49" charset="0"/>
+                <a:cs typeface="Courier New" pitchFamily="49" charset="0"/>
+              </a:rPr>
+              <a:t>public</a:t>
+            </a:r>
+            <a:r>
+              <a:rPr lang="de-CH" dirty="0">
+                <a:latin typeface="Courier New" pitchFamily="49" charset="0"/>
+                <a:cs typeface="Courier New" pitchFamily="49" charset="0"/>
+              </a:rPr>
+              <a:t> </a:t>
+            </a:r>
+            <a:r>
+              <a:rPr lang="de-CH" dirty="0" err="1">
+                <a:latin typeface="Courier New" pitchFamily="49" charset="0"/>
+                <a:cs typeface="Courier New" pitchFamily="49" charset="0"/>
+              </a:rPr>
+              <a:t>static</a:t>
+            </a:r>
+            <a:r>
+              <a:rPr lang="de-CH" dirty="0">
+                <a:latin typeface="Courier New" pitchFamily="49" charset="0"/>
+                <a:cs typeface="Courier New" pitchFamily="49" charset="0"/>
+              </a:rPr>
+              <a:t> </a:t>
+            </a:r>
+            <a:r>
+              <a:rPr lang="de-CH" dirty="0" err="1">
+                <a:latin typeface="Courier New" pitchFamily="49" charset="0"/>
+                <a:cs typeface="Courier New" pitchFamily="49" charset="0"/>
+              </a:rPr>
+              <a:t>void</a:t>
+            </a:r>
+            <a:r>
+              <a:rPr lang="de-CH" dirty="0">
+                <a:latin typeface="Courier New" pitchFamily="49" charset="0"/>
+                <a:cs typeface="Courier New" pitchFamily="49" charset="0"/>
+              </a:rPr>
+              <a:t> </a:t>
+            </a:r>
+            <a:r>
+              <a:rPr lang="de-CH" dirty="0" err="1">
+                <a:latin typeface="Courier New" pitchFamily="49" charset="0"/>
+                <a:cs typeface="Courier New" pitchFamily="49" charset="0"/>
+              </a:rPr>
+              <a:t>main</a:t>
+            </a:r>
+            <a:r>
+              <a:rPr lang="de-CH" dirty="0">
+                <a:latin typeface="Courier New" pitchFamily="49" charset="0"/>
+                <a:cs typeface="Courier New" pitchFamily="49" charset="0"/>
+              </a:rPr>
+              <a:t>(String[] </a:t>
+            </a:r>
+            <a:r>
+              <a:rPr lang="de-CH" dirty="0" err="1">
+                <a:latin typeface="Courier New" pitchFamily="49" charset="0"/>
+                <a:cs typeface="Courier New" pitchFamily="49" charset="0"/>
+              </a:rPr>
+              <a:t>args</a:t>
+            </a:r>
+            <a:r>
+              <a:rPr lang="de-CH" dirty="0">
+                <a:latin typeface="Courier New" pitchFamily="49" charset="0"/>
+                <a:cs typeface="Courier New" pitchFamily="49" charset="0"/>
+              </a:rPr>
+              <a:t>) { </a:t>
+            </a:r>
+            <a:br>
+              <a:rPr lang="de-CH" dirty="0">
+                <a:latin typeface="Courier New" pitchFamily="49" charset="0"/>
+                <a:cs typeface="Courier New" pitchFamily="49" charset="0"/>
+              </a:rPr>
+            </a:br>
+            <a:r>
+              <a:rPr lang="de-CH" dirty="0">
+                <a:latin typeface="Courier New" pitchFamily="49" charset="0"/>
+                <a:cs typeface="Courier New" pitchFamily="49" charset="0"/>
+              </a:rPr>
+              <a:t>        </a:t>
+            </a:r>
+            <a:r>
+              <a:rPr lang="de-CH" dirty="0" err="1">
+                <a:latin typeface="Courier New" pitchFamily="49" charset="0"/>
+                <a:cs typeface="Courier New" pitchFamily="49" charset="0"/>
+              </a:rPr>
+              <a:t>IGericht</a:t>
+            </a:r>
+            <a:r>
+              <a:rPr lang="de-CH" dirty="0">
+                <a:latin typeface="Courier New" pitchFamily="49" charset="0"/>
+                <a:cs typeface="Courier New" pitchFamily="49" charset="0"/>
+              </a:rPr>
+              <a:t> </a:t>
+            </a:r>
+            <a:r>
+              <a:rPr lang="de-CH" dirty="0" err="1">
+                <a:latin typeface="Courier New" pitchFamily="49" charset="0"/>
+                <a:cs typeface="Courier New" pitchFamily="49" charset="0"/>
+              </a:rPr>
+              <a:t>gericht</a:t>
+            </a:r>
+            <a:r>
+              <a:rPr lang="de-CH" dirty="0">
+                <a:latin typeface="Courier New" pitchFamily="49" charset="0"/>
+                <a:cs typeface="Courier New" pitchFamily="49" charset="0"/>
+              </a:rPr>
+              <a:t> = </a:t>
+            </a:r>
+            <a:r>
+              <a:rPr lang="de-CH" dirty="0" err="1">
+                <a:latin typeface="Courier New" pitchFamily="49" charset="0"/>
+                <a:cs typeface="Courier New" pitchFamily="49" charset="0"/>
+              </a:rPr>
+              <a:t>new</a:t>
+            </a:r>
+            <a:r>
+              <a:rPr lang="de-CH" dirty="0">
+                <a:latin typeface="Courier New" pitchFamily="49" charset="0"/>
+                <a:cs typeface="Courier New" pitchFamily="49" charset="0"/>
+              </a:rPr>
+              <a:t> Salat(</a:t>
+            </a:r>
+            <a:r>
+              <a:rPr lang="de-CH" dirty="0" err="1">
+                <a:latin typeface="Courier New" pitchFamily="49" charset="0"/>
+                <a:cs typeface="Courier New" pitchFamily="49" charset="0"/>
+              </a:rPr>
+              <a:t>new</a:t>
+            </a:r>
+            <a:r>
+              <a:rPr lang="de-CH" dirty="0">
+                <a:latin typeface="Courier New" pitchFamily="49" charset="0"/>
+                <a:cs typeface="Courier New" pitchFamily="49" charset="0"/>
+              </a:rPr>
+              <a:t> Nudeln(</a:t>
+            </a:r>
+            <a:r>
+              <a:rPr lang="de-CH" dirty="0" err="1">
+                <a:latin typeface="Courier New" pitchFamily="49" charset="0"/>
+                <a:cs typeface="Courier New" pitchFamily="49" charset="0"/>
+              </a:rPr>
+              <a:t>new</a:t>
+            </a:r>
+            <a:r>
+              <a:rPr lang="de-CH" dirty="0">
+                <a:latin typeface="Courier New" pitchFamily="49" charset="0"/>
+                <a:cs typeface="Courier New" pitchFamily="49" charset="0"/>
+              </a:rPr>
+              <a:t> </a:t>
+            </a:r>
+            <a:r>
+              <a:rPr lang="de-CH" dirty="0" err="1">
+                <a:latin typeface="Courier New" pitchFamily="49" charset="0"/>
+                <a:cs typeface="Courier New" pitchFamily="49" charset="0"/>
+              </a:rPr>
+              <a:t>Hueftsteak</a:t>
+            </a:r>
+            <a:r>
+              <a:rPr lang="de-CH" dirty="0">
+                <a:latin typeface="Courier New" pitchFamily="49" charset="0"/>
+                <a:cs typeface="Courier New" pitchFamily="49" charset="0"/>
+              </a:rPr>
+              <a:t>())); </a:t>
+            </a:r>
+            <a:br>
+              <a:rPr lang="de-CH" dirty="0">
+                <a:latin typeface="Courier New" pitchFamily="49" charset="0"/>
+                <a:cs typeface="Courier New" pitchFamily="49" charset="0"/>
+              </a:rPr>
+            </a:br>
+            <a:r>
+              <a:rPr lang="de-CH" dirty="0">
+                <a:latin typeface="Courier New" pitchFamily="49" charset="0"/>
+                <a:cs typeface="Courier New" pitchFamily="49" charset="0"/>
+              </a:rPr>
+              <a:t>        </a:t>
+            </a:r>
+            <a:r>
+              <a:rPr lang="de-CH" dirty="0" err="1">
+                <a:latin typeface="Courier New" pitchFamily="49" charset="0"/>
+                <a:cs typeface="Courier New" pitchFamily="49" charset="0"/>
+              </a:rPr>
+              <a:t>gericht.druckeBeschreibung</a:t>
+            </a:r>
+            <a:r>
+              <a:rPr lang="de-CH" dirty="0">
+                <a:latin typeface="Courier New" pitchFamily="49" charset="0"/>
+                <a:cs typeface="Courier New" pitchFamily="49" charset="0"/>
+              </a:rPr>
+              <a:t>(); </a:t>
+            </a:r>
+            <a:br>
+              <a:rPr lang="de-CH" dirty="0">
+                <a:latin typeface="Courier New" pitchFamily="49" charset="0"/>
+                <a:cs typeface="Courier New" pitchFamily="49" charset="0"/>
+              </a:rPr>
+            </a:br>
+            <a:r>
+              <a:rPr lang="de-CH" dirty="0">
+                <a:latin typeface="Courier New" pitchFamily="49" charset="0"/>
+                <a:cs typeface="Courier New" pitchFamily="49" charset="0"/>
+              </a:rPr>
+              <a:t>        //Hüftsteak, Nudeln, Salat </a:t>
+            </a:r>
+            <a:br>
+              <a:rPr lang="de-CH" dirty="0">
+                <a:latin typeface="Courier New" pitchFamily="49" charset="0"/>
+                <a:cs typeface="Courier New" pitchFamily="49" charset="0"/>
+              </a:rPr>
+            </a:br>
+            <a:r>
+              <a:rPr lang="de-CH" dirty="0">
+                <a:latin typeface="Courier New" pitchFamily="49" charset="0"/>
+                <a:cs typeface="Courier New" pitchFamily="49" charset="0"/>
+              </a:rPr>
+              <a:t>        </a:t>
+            </a:r>
+            <a:r>
+              <a:rPr lang="de-CH" dirty="0" err="1">
+                <a:latin typeface="Courier New" pitchFamily="49" charset="0"/>
+                <a:cs typeface="Courier New" pitchFamily="49" charset="0"/>
+              </a:rPr>
+              <a:t>System.out.println</a:t>
+            </a:r>
+            <a:r>
+              <a:rPr lang="de-CH" dirty="0">
+                <a:latin typeface="Courier New" pitchFamily="49" charset="0"/>
+                <a:cs typeface="Courier New" pitchFamily="49" charset="0"/>
+              </a:rPr>
+              <a:t>(" für "+</a:t>
+            </a:r>
+            <a:r>
+              <a:rPr lang="de-CH" dirty="0" err="1">
+                <a:latin typeface="Courier New" pitchFamily="49" charset="0"/>
+                <a:cs typeface="Courier New" pitchFamily="49" charset="0"/>
+              </a:rPr>
+              <a:t>gericht.getPreis</a:t>
+            </a:r>
+            <a:r>
+              <a:rPr lang="de-CH" dirty="0">
+                <a:latin typeface="Courier New" pitchFamily="49" charset="0"/>
+                <a:cs typeface="Courier New" pitchFamily="49" charset="0"/>
+              </a:rPr>
+              <a:t>() + " </a:t>
+            </a:r>
+            <a:r>
+              <a:rPr lang="de-CH" dirty="0" err="1" smtClean="0">
+                <a:latin typeface="Courier New" pitchFamily="49" charset="0"/>
+                <a:cs typeface="Courier New" pitchFamily="49" charset="0"/>
+              </a:rPr>
+              <a:t>SFr</a:t>
+            </a:r>
+            <a:r>
+              <a:rPr lang="de-CH" dirty="0" smtClean="0">
+                <a:latin typeface="Courier New" pitchFamily="49" charset="0"/>
+                <a:cs typeface="Courier New" pitchFamily="49" charset="0"/>
+              </a:rPr>
+              <a:t>"); </a:t>
+            </a:r>
+            <a:r>
+              <a:rPr lang="de-CH" dirty="0">
+                <a:latin typeface="Courier New" pitchFamily="49" charset="0"/>
+                <a:cs typeface="Courier New" pitchFamily="49" charset="0"/>
+              </a:rPr>
+              <a:t/>
+            </a:r>
+            <a:br>
+              <a:rPr lang="de-CH" dirty="0">
+                <a:latin typeface="Courier New" pitchFamily="49" charset="0"/>
+                <a:cs typeface="Courier New" pitchFamily="49" charset="0"/>
+              </a:rPr>
+            </a:br>
+            <a:r>
+              <a:rPr lang="de-CH" dirty="0">
+                <a:latin typeface="Courier New" pitchFamily="49" charset="0"/>
+                <a:cs typeface="Courier New" pitchFamily="49" charset="0"/>
+              </a:rPr>
+              <a:t>        // für 19.75  </a:t>
+            </a:r>
+            <a:r>
+              <a:rPr lang="de-CH" dirty="0" err="1">
+                <a:latin typeface="Courier New" pitchFamily="49" charset="0"/>
+                <a:cs typeface="Courier New" pitchFamily="49" charset="0"/>
+              </a:rPr>
+              <a:t>SFr</a:t>
+            </a:r>
+            <a:r>
+              <a:rPr lang="de-CH" dirty="0">
+                <a:latin typeface="Courier New" pitchFamily="49" charset="0"/>
+                <a:cs typeface="Courier New" pitchFamily="49" charset="0"/>
+              </a:rPr>
+              <a:t/>
+            </a:r>
+            <a:br>
+              <a:rPr lang="de-CH" dirty="0">
+                <a:latin typeface="Courier New" pitchFamily="49" charset="0"/>
+                <a:cs typeface="Courier New" pitchFamily="49" charset="0"/>
+              </a:rPr>
+            </a:br>
+            <a:r>
+              <a:rPr lang="de-CH" dirty="0">
+                <a:latin typeface="Courier New" pitchFamily="49" charset="0"/>
+                <a:cs typeface="Courier New" pitchFamily="49" charset="0"/>
+              </a:rPr>
+              <a:t/>
+            </a:r>
+            <a:br>
+              <a:rPr lang="de-CH" dirty="0">
+                <a:latin typeface="Courier New" pitchFamily="49" charset="0"/>
+                <a:cs typeface="Courier New" pitchFamily="49" charset="0"/>
+              </a:rPr>
+            </a:br>
+            <a:r>
+              <a:rPr lang="de-CH" dirty="0">
+                <a:latin typeface="Courier New" pitchFamily="49" charset="0"/>
+                <a:cs typeface="Courier New" pitchFamily="49" charset="0"/>
+              </a:rPr>
+              <a:t>        </a:t>
+            </a:r>
+            <a:r>
+              <a:rPr lang="de-CH" dirty="0" err="1">
+                <a:latin typeface="Courier New" pitchFamily="49" charset="0"/>
+                <a:cs typeface="Courier New" pitchFamily="49" charset="0"/>
+              </a:rPr>
+              <a:t>gericht</a:t>
+            </a:r>
+            <a:r>
+              <a:rPr lang="de-CH" dirty="0">
+                <a:latin typeface="Courier New" pitchFamily="49" charset="0"/>
+                <a:cs typeface="Courier New" pitchFamily="49" charset="0"/>
+              </a:rPr>
+              <a:t> = </a:t>
+            </a:r>
+            <a:r>
+              <a:rPr lang="de-CH" dirty="0" err="1">
+                <a:latin typeface="Courier New" pitchFamily="49" charset="0"/>
+                <a:cs typeface="Courier New" pitchFamily="49" charset="0"/>
+              </a:rPr>
+              <a:t>new</a:t>
+            </a:r>
+            <a:r>
+              <a:rPr lang="de-CH" dirty="0">
+                <a:latin typeface="Courier New" pitchFamily="49" charset="0"/>
+                <a:cs typeface="Courier New" pitchFamily="49" charset="0"/>
+              </a:rPr>
+              <a:t> Suppe(</a:t>
+            </a:r>
+            <a:r>
+              <a:rPr lang="de-CH" dirty="0" err="1">
+                <a:latin typeface="Courier New" pitchFamily="49" charset="0"/>
+                <a:cs typeface="Courier New" pitchFamily="49" charset="0"/>
+              </a:rPr>
+              <a:t>gericht</a:t>
+            </a:r>
+            <a:r>
+              <a:rPr lang="de-CH" dirty="0">
+                <a:latin typeface="Courier New" pitchFamily="49" charset="0"/>
+                <a:cs typeface="Courier New" pitchFamily="49" charset="0"/>
+              </a:rPr>
+              <a:t>); </a:t>
+            </a:r>
+            <a:br>
+              <a:rPr lang="de-CH" dirty="0">
+                <a:latin typeface="Courier New" pitchFamily="49" charset="0"/>
+                <a:cs typeface="Courier New" pitchFamily="49" charset="0"/>
+              </a:rPr>
+            </a:br>
+            <a:r>
+              <a:rPr lang="de-CH" dirty="0">
+                <a:latin typeface="Courier New" pitchFamily="49" charset="0"/>
+                <a:cs typeface="Courier New" pitchFamily="49" charset="0"/>
+              </a:rPr>
+              <a:t>        </a:t>
+            </a:r>
+            <a:r>
+              <a:rPr lang="de-CH" dirty="0" err="1">
+                <a:latin typeface="Courier New" pitchFamily="49" charset="0"/>
+                <a:cs typeface="Courier New" pitchFamily="49" charset="0"/>
+              </a:rPr>
+              <a:t>gericht.druckeBeschreibung</a:t>
+            </a:r>
+            <a:r>
+              <a:rPr lang="de-CH" dirty="0">
+                <a:latin typeface="Courier New" pitchFamily="49" charset="0"/>
+                <a:cs typeface="Courier New" pitchFamily="49" charset="0"/>
+              </a:rPr>
+              <a:t>(); </a:t>
+            </a:r>
+            <a:br>
+              <a:rPr lang="de-CH" dirty="0">
+                <a:latin typeface="Courier New" pitchFamily="49" charset="0"/>
+                <a:cs typeface="Courier New" pitchFamily="49" charset="0"/>
+              </a:rPr>
+            </a:br>
+            <a:r>
+              <a:rPr lang="de-CH" dirty="0">
+                <a:latin typeface="Courier New" pitchFamily="49" charset="0"/>
+                <a:cs typeface="Courier New" pitchFamily="49" charset="0"/>
+              </a:rPr>
+              <a:t>        //Hüftsteak, Nudeln, Salat, Suppe </a:t>
+            </a:r>
+            <a:br>
+              <a:rPr lang="de-CH" dirty="0">
+                <a:latin typeface="Courier New" pitchFamily="49" charset="0"/>
+                <a:cs typeface="Courier New" pitchFamily="49" charset="0"/>
+              </a:rPr>
+            </a:br>
+            <a:r>
+              <a:rPr lang="de-CH" dirty="0">
+                <a:latin typeface="Courier New" pitchFamily="49" charset="0"/>
+                <a:cs typeface="Courier New" pitchFamily="49" charset="0"/>
+              </a:rPr>
+              <a:t>        </a:t>
+            </a:r>
+            <a:r>
+              <a:rPr lang="de-CH" dirty="0" err="1">
+                <a:latin typeface="Courier New" pitchFamily="49" charset="0"/>
+                <a:cs typeface="Courier New" pitchFamily="49" charset="0"/>
+              </a:rPr>
+              <a:t>System.out.println</a:t>
+            </a:r>
+            <a:r>
+              <a:rPr lang="de-CH" dirty="0">
+                <a:latin typeface="Courier New" pitchFamily="49" charset="0"/>
+                <a:cs typeface="Courier New" pitchFamily="49" charset="0"/>
+              </a:rPr>
+              <a:t>(" für "+</a:t>
+            </a:r>
+            <a:r>
+              <a:rPr lang="de-CH" dirty="0" err="1">
+                <a:latin typeface="Courier New" pitchFamily="49" charset="0"/>
+                <a:cs typeface="Courier New" pitchFamily="49" charset="0"/>
+              </a:rPr>
+              <a:t>gericht.getPreis</a:t>
+            </a:r>
+            <a:r>
+              <a:rPr lang="de-CH" dirty="0">
+                <a:latin typeface="Courier New" pitchFamily="49" charset="0"/>
+                <a:cs typeface="Courier New" pitchFamily="49" charset="0"/>
+              </a:rPr>
+              <a:t>() + "  </a:t>
+            </a:r>
+            <a:r>
+              <a:rPr lang="de-CH" dirty="0" err="1">
+                <a:latin typeface="Courier New" pitchFamily="49" charset="0"/>
+                <a:cs typeface="Courier New" pitchFamily="49" charset="0"/>
+              </a:rPr>
+              <a:t>SFr</a:t>
+            </a:r>
+            <a:r>
+              <a:rPr lang="de-CH" dirty="0">
+                <a:latin typeface="Courier New" pitchFamily="49" charset="0"/>
+                <a:cs typeface="Courier New" pitchFamily="49" charset="0"/>
+              </a:rPr>
+              <a:t> </a:t>
+            </a:r>
+            <a:r>
+              <a:rPr lang="de-CH" dirty="0" smtClean="0">
+                <a:latin typeface="Courier New" pitchFamily="49" charset="0"/>
+                <a:cs typeface="Courier New" pitchFamily="49" charset="0"/>
+              </a:rPr>
+              <a:t>"); </a:t>
+            </a:r>
+            <a:r>
+              <a:rPr lang="de-CH" dirty="0">
+                <a:latin typeface="Courier New" pitchFamily="49" charset="0"/>
+                <a:cs typeface="Courier New" pitchFamily="49" charset="0"/>
+              </a:rPr>
+              <a:t/>
+            </a:r>
+            <a:br>
+              <a:rPr lang="de-CH" dirty="0">
+                <a:latin typeface="Courier New" pitchFamily="49" charset="0"/>
+                <a:cs typeface="Courier New" pitchFamily="49" charset="0"/>
+              </a:rPr>
+            </a:br>
+            <a:r>
+              <a:rPr lang="de-CH" dirty="0">
+                <a:latin typeface="Courier New" pitchFamily="49" charset="0"/>
+                <a:cs typeface="Courier New" pitchFamily="49" charset="0"/>
+              </a:rPr>
+              <a:t>        // für 21.25  </a:t>
+            </a:r>
+            <a:r>
+              <a:rPr lang="de-CH" dirty="0" err="1">
+                <a:latin typeface="Courier New" pitchFamily="49" charset="0"/>
+                <a:cs typeface="Courier New" pitchFamily="49" charset="0"/>
+              </a:rPr>
+              <a:t>SFr</a:t>
+            </a:r>
+            <a:r>
+              <a:rPr lang="de-CH" dirty="0">
+                <a:latin typeface="Courier New" pitchFamily="49" charset="0"/>
+                <a:cs typeface="Courier New" pitchFamily="49" charset="0"/>
+              </a:rPr>
+              <a:t/>
+            </a:r>
+            <a:br>
+              <a:rPr lang="de-CH" dirty="0">
+                <a:latin typeface="Courier New" pitchFamily="49" charset="0"/>
+                <a:cs typeface="Courier New" pitchFamily="49" charset="0"/>
+              </a:rPr>
+            </a:br>
+            <a:r>
+              <a:rPr lang="de-CH" dirty="0">
+                <a:latin typeface="Courier New" pitchFamily="49" charset="0"/>
+                <a:cs typeface="Courier New" pitchFamily="49" charset="0"/>
+              </a:rPr>
+              <a:t>    }  </a:t>
+            </a:r>
+            <a:endParaRPr lang="de-CH" dirty="0" smtClean="0">
+              <a:latin typeface="Courier New" pitchFamily="49" charset="0"/>
+              <a:cs typeface="Courier New" pitchFamily="49" charset="0"/>
+            </a:endParaRPr>
+          </a:p>
+        </p:txBody>
+      </p:sp>
+    </p:spTree>
+    <p:extLst>
+      <p:ext uri="{BB962C8B-B14F-4D97-AF65-F5344CB8AC3E}">
+        <p14:creationId xmlns:p14="http://schemas.microsoft.com/office/powerpoint/2010/main" val="3411068433"/>
+      </p:ext>
+    </p:extLst>
+  </p:cSld>
+  <p:clrMapOvr>
+    <a:masterClrMapping/>
+  </p:clrMapOvr>
+  <p:timing>
+    <p:tnLst>
+      <p:par>
+        <p:cTn id="1" dur="indefinite" restart="never" nodeType="tmRoot"/>
+      </p:par>
+    </p:tnLst>
+  </p:timing>
+</p:sld>
+</file>
+
 <file path=ppt/slides/slide2.xml><?xml version="1.0" encoding="utf-8"?>
 <p:sld xmlns:a="http://schemas.openxmlformats.org/drawingml/2006/main" xmlns:r="http://schemas.openxmlformats.org/officeDocument/2006/relationships" xmlns:p="http://schemas.openxmlformats.org/presentationml/2006/main">
   <p:cSld>
@@ -6421,16 +7916,16 @@
           <a:lstStyle/>
           <a:p>
             <a:r>
+              <a:rPr lang="de-CH" dirty="0" err="1" smtClean="0"/>
+              <a:t>Anwendunsgebiet</a:t>
+            </a:r>
+            <a:r>
               <a:rPr lang="de-CH" dirty="0" smtClean="0"/>
-              <a:t>Design-Probleme die mit </a:t>
+              <a:t> für </a:t>
             </a:r>
             <a:r>
               <a:rPr lang="de-CH" dirty="0" err="1" smtClean="0"/>
-              <a:t>Decorator</a:t>
-            </a:r>
-            <a:r>
-              <a:rPr lang="de-CH" dirty="0" smtClean="0"/>
-              <a:t> gelöst werden können</a:t>
+              <a:t>Dekorierer</a:t>
             </a:r>
             <a:endParaRPr lang="de-CH" dirty="0"/>
           </a:p>
@@ -6519,24 +8014,16 @@
           <a:lstStyle/>
           <a:p>
             <a:r>
-              <a:rPr lang="en-GB" dirty="0" err="1" smtClean="0"/>
-              <a:t>Klassen</a:t>
-            </a:r>
-            <a:r>
-              <a:rPr lang="en-GB" dirty="0" smtClean="0"/>
-              <a:t> </a:t>
-            </a:r>
-            <a:r>
-              <a:rPr lang="en-GB" dirty="0" err="1" smtClean="0"/>
-              <a:t>Diagramm</a:t>
-            </a:r>
-            <a:endParaRPr lang="en-GB" dirty="0"/>
+              <a:rPr lang="de-CH" dirty="0" smtClean="0"/>
+              <a:t>Klassen Diagramm</a:t>
+            </a:r>
+            <a:endParaRPr lang="de-CH" dirty="0"/>
           </a:p>
         </p:txBody>
       </p:sp>
       <p:pic>
         <p:nvPicPr>
-          <p:cNvPr id="3" name="Picture 2" descr="http://upload.wikimedia.org/wikipedia/commons/thumb/6/69/Dekorierer.svg/499px-Dekorierer.svg.png"/>
+          <p:cNvPr id="1028" name="Picture 4" descr="http://upload.wikimedia.org/wikipedia/commons/thumb/e/e9/Decorator_UML_class_diagram.svg/400px-Decorator_UML_class_diagram.svg.png"/>
           <p:cNvPicPr>
             <a:picLocks noChangeAspect="1" noChangeArrowheads="1"/>
           </p:cNvPicPr>
@@ -6552,18 +8039,6 @@
               </a:schemeClr>
             </a:duotone>
             <a:extLst>
-              <a:ext uri="{BEBA8EAE-BF5A-486C-A8C5-ECC9F3942E4B}">
-                <a14:imgProps xmlns:a14="http://schemas.microsoft.com/office/drawing/2010/main">
-                  <a14:imgLayer r:embed="rId3">
-                    <a14:imgEffect>
-                      <a14:colorTemperature colorTemp="8800"/>
-                    </a14:imgEffect>
-                    <a14:imgEffect>
-                      <a14:saturation sat="0"/>
-                    </a14:imgEffect>
-                  </a14:imgLayer>
-                </a14:imgProps>
-              </a:ext>
               <a:ext uri="{28A0092B-C50C-407E-A947-70E740481C1C}">
                 <a14:useLocalDpi xmlns:a14="http://schemas.microsoft.com/office/drawing/2010/main" val="0"/>
               </a:ext>
@@ -6576,8 +8051,8 @@
         </p:blipFill>
         <p:spPr bwMode="auto">
           <a:xfrm>
-            <a:off x="1267402" y="1540665"/>
-            <a:ext cx="7129941" cy="4272251"/>
+            <a:off x="1447512" y="1204668"/>
+            <a:ext cx="6428798" cy="5094822"/>
           </a:xfrm>
           <a:prstGeom prst="rect">
             <a:avLst/>
@@ -6641,22 +8116,83 @@
             <p:ph type="title"/>
           </p:nvPr>
         </p:nvSpPr>
-        <p:spPr/>
+        <p:spPr>
+          <a:xfrm>
+            <a:off x="677334" y="640772"/>
+            <a:ext cx="8596668" cy="1320800"/>
+          </a:xfrm>
+        </p:spPr>
         <p:txBody>
           <a:bodyPr/>
           <a:lstStyle/>
           <a:p>
             <a:r>
-              <a:rPr lang="en-GB" dirty="0" smtClean="0"/>
-              <a:t>Package Diagram</a:t>
-            </a:r>
-            <a:endParaRPr lang="en-GB" dirty="0"/>
+              <a:rPr lang="de-CH" dirty="0" smtClean="0"/>
+              <a:t>Funktionsweise des Pattern</a:t>
+            </a:r>
+            <a:endParaRPr lang="de-CH" dirty="0"/>
+          </a:p>
+        </p:txBody>
+      </p:sp>
+      <p:sp>
+        <p:nvSpPr>
+          <p:cNvPr id="3" name="Inhaltsplatzhalter 2"/>
+          <p:cNvSpPr>
+            <a:spLocks noGrp="1"/>
+          </p:cNvSpPr>
+          <p:nvPr>
+            <p:ph idx="1"/>
+          </p:nvPr>
+        </p:nvSpPr>
+        <p:spPr/>
+        <p:txBody>
+          <a:bodyPr/>
+          <a:lstStyle/>
+          <a:p>
+            <a:r>
+              <a:rPr lang="de-CH" dirty="0" err="1" smtClean="0"/>
+              <a:t>Dekorierer</a:t>
+            </a:r>
+            <a:r>
+              <a:rPr lang="de-CH" dirty="0" smtClean="0"/>
+              <a:t> schalten </a:t>
+            </a:r>
+            <a:r>
+              <a:rPr lang="de-CH" dirty="0"/>
+              <a:t>sich vor </a:t>
+            </a:r>
+            <a:r>
+              <a:rPr lang="de-CH" dirty="0" smtClean="0"/>
+              <a:t>die Komponenten</a:t>
+            </a:r>
+            <a:endParaRPr lang="de-CH" dirty="0"/>
+          </a:p>
+          <a:p>
+            <a:r>
+              <a:rPr lang="de-CH" dirty="0" err="1" smtClean="0"/>
+              <a:t>Dekorierer</a:t>
+            </a:r>
+            <a:r>
+              <a:rPr lang="de-CH" dirty="0" smtClean="0"/>
+              <a:t> sind für die Aufrufenden Klassen nicht sichtbar</a:t>
+            </a:r>
+          </a:p>
+          <a:p>
+            <a:r>
+              <a:rPr lang="de-CH" dirty="0" err="1" smtClean="0"/>
+              <a:t>Dekorierer</a:t>
+            </a:r>
+            <a:r>
+              <a:rPr lang="de-CH" dirty="0" smtClean="0"/>
+              <a:t> müssen wo nötig die dekorierten Methoden selber aufrufen</a:t>
+            </a:r>
+            <a:endParaRPr lang="de-CH" dirty="0" smtClean="0"/>
           </a:p>
         </p:txBody>
       </p:sp>
       <p:pic>
         <p:nvPicPr>
-          <p:cNvPr id="1026" name="Picture 2"/>
+          <p:cNvPr id="2052" name="Picture 4" descr="Decorator Design Pattern"/>
           <p:cNvPicPr>
             <a:picLocks noChangeAspect="1" noChangeArrowheads="1"/>
           </p:cNvPicPr>
@@ -6664,22 +8200,257 @@
         </p:nvPicPr>
         <p:blipFill>
           <a:blip r:embed="rId2">
-            <a:clrChange>
-              <a:clrFrom>
-                <a:srgbClr val="FFFFFF"/>
-              </a:clrFrom>
-              <a:clrTo>
-                <a:srgbClr val="FFFFFF">
-                  <a:alpha val="0"/>
-                </a:srgbClr>
-              </a:clrTo>
-            </a:clrChange>
+            <a:extLst>
+              <a:ext uri="{28A0092B-C50C-407E-A947-70E740481C1C}">
+                <a14:useLocalDpi xmlns:a14="http://schemas.microsoft.com/office/drawing/2010/main" val="0"/>
+              </a:ext>
+            </a:extLst>
+          </a:blip>
+          <a:srcRect/>
+          <a:stretch>
+            <a:fillRect/>
+          </a:stretch>
+        </p:blipFill>
+        <p:spPr bwMode="auto">
+          <a:xfrm>
+            <a:off x="1911638" y="3526225"/>
+            <a:ext cx="6141316" cy="2763594"/>
+          </a:xfrm>
+          <a:prstGeom prst="rect">
+            <a:avLst/>
+          </a:prstGeom>
+          <a:noFill/>
+          <a:extLst>
+            <a:ext uri="{909E8E84-426E-40DD-AFC4-6F175D3DCCD1}">
+              <a14:hiddenFill xmlns:a14="http://schemas.microsoft.com/office/drawing/2010/main">
+                <a:solidFill>
+                  <a:srgbClr val="FFFFFF"/>
+                </a:solidFill>
+              </a14:hiddenFill>
+            </a:ext>
+          </a:extLst>
+        </p:spPr>
+      </p:pic>
+    </p:spTree>
+    <p:extLst>
+      <p:ext uri="{BB962C8B-B14F-4D97-AF65-F5344CB8AC3E}">
+        <p14:creationId xmlns:p14="http://schemas.microsoft.com/office/powerpoint/2010/main" val="1896469946"/>
+      </p:ext>
+    </p:extLst>
+  </p:cSld>
+  <p:clrMapOvr>
+    <a:masterClrMapping/>
+  </p:clrMapOvr>
+  <p:timing>
+    <p:tnLst>
+      <p:par>
+        <p:cTn id="1" dur="indefinite" restart="never" nodeType="tmRoot"/>
+      </p:par>
+    </p:tnLst>
+  </p:timing>
+</p:sld>
+</file>
+
+<file path=ppt/slides/slide5.xml><?xml version="1.0" encoding="utf-8"?>
+<p:sld xmlns:a="http://schemas.openxmlformats.org/drawingml/2006/main" xmlns:r="http://schemas.openxmlformats.org/officeDocument/2006/relationships" xmlns:p="http://schemas.openxmlformats.org/presentationml/2006/main">
+  <p:cSld>
+    <p:spTree>
+      <p:nvGrpSpPr>
+        <p:cNvPr id="1" name=""/>
+        <p:cNvGrpSpPr/>
+        <p:nvPr/>
+      </p:nvGrpSpPr>
+      <p:grpSpPr>
+        <a:xfrm>
+          <a:off x="0" y="0"/>
+          <a:ext cx="0" cy="0"/>
+          <a:chOff x="0" y="0"/>
+          <a:chExt cx="0" cy="0"/>
+        </a:xfrm>
+      </p:grpSpPr>
+      <p:sp>
+        <p:nvSpPr>
+          <p:cNvPr id="2" name="Titel 1"/>
+          <p:cNvSpPr>
+            <a:spLocks noGrp="1"/>
+          </p:cNvSpPr>
+          <p:nvPr>
+            <p:ph type="title"/>
+          </p:nvPr>
+        </p:nvSpPr>
+        <p:spPr>
+          <a:xfrm>
+            <a:off x="677334" y="640772"/>
+            <a:ext cx="8596668" cy="1320800"/>
+          </a:xfrm>
+        </p:spPr>
+        <p:txBody>
+          <a:bodyPr/>
+          <a:lstStyle/>
+          <a:p>
+            <a:r>
+              <a:rPr lang="de-CH" dirty="0"/>
+              <a:t>Vorteile und Nachteile</a:t>
+            </a:r>
+            <a:endParaRPr lang="de-CH" dirty="0"/>
+          </a:p>
+        </p:txBody>
+      </p:sp>
+      <p:sp>
+        <p:nvSpPr>
+          <p:cNvPr id="3" name="Inhaltsplatzhalter 2"/>
+          <p:cNvSpPr>
+            <a:spLocks noGrp="1"/>
+          </p:cNvSpPr>
+          <p:nvPr>
+            <p:ph idx="1"/>
+          </p:nvPr>
+        </p:nvSpPr>
+        <p:spPr/>
+        <p:txBody>
+          <a:bodyPr/>
+          <a:lstStyle/>
+          <a:p>
+            <a:r>
+              <a:rPr lang="de-CH" dirty="0" smtClean="0"/>
+              <a:t>Mehrere </a:t>
+            </a:r>
+            <a:r>
+              <a:rPr lang="de-CH" dirty="0" err="1" smtClean="0"/>
+              <a:t>Dekorierer</a:t>
+            </a:r>
+            <a:r>
+              <a:rPr lang="de-CH" dirty="0" smtClean="0"/>
+              <a:t> können hintereinander angewendet werden</a:t>
+            </a:r>
+            <a:endParaRPr lang="de-CH" dirty="0"/>
+          </a:p>
+          <a:p>
+            <a:pPr lvl="1"/>
+            <a:r>
+              <a:rPr lang="de-CH" dirty="0" smtClean="0"/>
+              <a:t>Es können lange Hierarchie Bäume verkleinert werden</a:t>
+            </a:r>
+          </a:p>
+          <a:p>
+            <a:pPr lvl="1"/>
+            <a:r>
+              <a:rPr lang="de-CH" dirty="0" smtClean="0"/>
+              <a:t>Es können Multiplizierte Unterklassen verhindert werden</a:t>
+            </a:r>
+          </a:p>
+          <a:p>
+            <a:endParaRPr lang="de-CH" dirty="0"/>
+          </a:p>
+          <a:p>
+            <a:r>
+              <a:rPr lang="de-CH" dirty="0" err="1" smtClean="0"/>
+              <a:t>Dekorierer</a:t>
+            </a:r>
+            <a:r>
+              <a:rPr lang="de-CH" dirty="0" smtClean="0"/>
+              <a:t> müssen die Komponente kennen </a:t>
+            </a:r>
+          </a:p>
+          <a:p>
+            <a:r>
+              <a:rPr lang="de-CH" dirty="0" err="1" smtClean="0"/>
+              <a:t>Dekorierer</a:t>
+            </a:r>
+            <a:r>
+              <a:rPr lang="de-CH" dirty="0" smtClean="0"/>
+              <a:t> müssen die Funktionsaufrufe an Komponente weiterleiten</a:t>
+            </a:r>
+          </a:p>
+          <a:p>
+            <a:r>
+              <a:rPr lang="de-CH" dirty="0" err="1" smtClean="0"/>
+              <a:t>Dekorierer</a:t>
+            </a:r>
+            <a:r>
+              <a:rPr lang="de-CH" dirty="0" smtClean="0"/>
+              <a:t> haben nicht die gleiche Identität wie die Komponenten</a:t>
+            </a:r>
+            <a:endParaRPr lang="de-CH" dirty="0" smtClean="0"/>
+          </a:p>
+        </p:txBody>
+      </p:sp>
+    </p:spTree>
+    <p:extLst>
+      <p:ext uri="{BB962C8B-B14F-4D97-AF65-F5344CB8AC3E}">
+        <p14:creationId xmlns:p14="http://schemas.microsoft.com/office/powerpoint/2010/main" val="741028467"/>
+      </p:ext>
+    </p:extLst>
+  </p:cSld>
+  <p:clrMapOvr>
+    <a:masterClrMapping/>
+  </p:clrMapOvr>
+  <p:timing>
+    <p:tnLst>
+      <p:par>
+        <p:cTn id="1" dur="indefinite" restart="never" nodeType="tmRoot"/>
+      </p:par>
+    </p:tnLst>
+  </p:timing>
+</p:sld>
+</file>
+
+<file path=ppt/slides/slide6.xml><?xml version="1.0" encoding="utf-8"?>
+<p:sld xmlns:a="http://schemas.openxmlformats.org/drawingml/2006/main" xmlns:r="http://schemas.openxmlformats.org/officeDocument/2006/relationships" xmlns:p="http://schemas.openxmlformats.org/presentationml/2006/main">
+  <p:cSld>
+    <p:spTree>
+      <p:nvGrpSpPr>
+        <p:cNvPr id="1" name=""/>
+        <p:cNvGrpSpPr/>
+        <p:nvPr/>
+      </p:nvGrpSpPr>
+      <p:grpSpPr>
+        <a:xfrm>
+          <a:off x="0" y="0"/>
+          <a:ext cx="0" cy="0"/>
+          <a:chOff x="0" y="0"/>
+          <a:chExt cx="0" cy="0"/>
+        </a:xfrm>
+      </p:grpSpPr>
+      <p:sp>
+        <p:nvSpPr>
+          <p:cNvPr id="2" name="Titel 1"/>
+          <p:cNvSpPr>
+            <a:spLocks noGrp="1"/>
+          </p:cNvSpPr>
+          <p:nvPr>
+            <p:ph type="title"/>
+          </p:nvPr>
+        </p:nvSpPr>
+        <p:spPr/>
+        <p:txBody>
+          <a:bodyPr/>
+          <a:lstStyle/>
+          <a:p>
+            <a:r>
+              <a:rPr lang="de-CH" dirty="0" smtClean="0"/>
+              <a:t>Klassen Diagramm Beispiel</a:t>
+            </a:r>
+            <a:endParaRPr lang="de-CH" dirty="0"/>
+          </a:p>
+        </p:txBody>
+      </p:sp>
+      <p:pic>
+        <p:nvPicPr>
+          <p:cNvPr id="3074" name="Picture 2" descr="Decorator Design Pattern"/>
+          <p:cNvPicPr>
+            <a:picLocks noChangeAspect="1" noChangeArrowheads="1"/>
+          </p:cNvPicPr>
+          <p:nvPr/>
+        </p:nvPicPr>
+        <p:blipFill>
+          <a:blip r:embed="rId2">
             <a:duotone>
-              <a:prstClr val="black"/>
-              <a:schemeClr val="accent1">
-                <a:tint val="45000"/>
-                <a:satMod val="400000"/>
+              <a:schemeClr val="accent2">
+                <a:shade val="45000"/>
+                <a:satMod val="135000"/>
               </a:schemeClr>
+              <a:prstClr val="white"/>
             </a:duotone>
             <a:extLst>
               <a:ext uri="{28A0092B-C50C-407E-A947-70E740481C1C}">
@@ -6694,33 +8465,20 @@
         </p:blipFill>
         <p:spPr bwMode="auto">
           <a:xfrm>
-            <a:off x="72989" y="2473038"/>
-            <a:ext cx="9850398" cy="1724890"/>
+            <a:off x="1225837" y="1357900"/>
+            <a:ext cx="7554479" cy="4860049"/>
           </a:xfrm>
           <a:prstGeom prst="rect">
             <a:avLst/>
           </a:prstGeom>
           <a:noFill/>
-          <a:ln>
-            <a:noFill/>
-          </a:ln>
           <a:extLst>
             <a:ext uri="{909E8E84-426E-40DD-AFC4-6F175D3DCCD1}">
               <a14:hiddenFill xmlns:a14="http://schemas.microsoft.com/office/drawing/2010/main">
                 <a:solidFill>
-                  <a:schemeClr val="accent1"/>
+                  <a:srgbClr val="FFFFFF"/>
                 </a:solidFill>
               </a14:hiddenFill>
-            </a:ext>
-            <a:ext uri="{91240B29-F687-4F45-9708-019B960494DF}">
-              <a14:hiddenLine xmlns:a14="http://schemas.microsoft.com/office/drawing/2010/main" w="9525">
-                <a:solidFill>
-                  <a:schemeClr val="tx1"/>
-                </a:solidFill>
-                <a:miter lim="800000"/>
-                <a:headEnd/>
-                <a:tailEnd/>
-              </a14:hiddenLine>
             </a:ext>
           </a:extLst>
         </p:spPr>
@@ -6728,7 +8486,1238 @@
     </p:spTree>
     <p:extLst>
       <p:ext uri="{BB962C8B-B14F-4D97-AF65-F5344CB8AC3E}">
-        <p14:creationId xmlns:p14="http://schemas.microsoft.com/office/powerpoint/2010/main" val="2221088016"/>
+        <p14:creationId xmlns:p14="http://schemas.microsoft.com/office/powerpoint/2010/main" val="4104649859"/>
+      </p:ext>
+    </p:extLst>
+  </p:cSld>
+  <p:clrMapOvr>
+    <a:masterClrMapping/>
+  </p:clrMapOvr>
+  <p:timing>
+    <p:tnLst>
+      <p:par>
+        <p:cTn id="1" dur="indefinite" restart="never" nodeType="tmRoot"/>
+      </p:par>
+    </p:tnLst>
+  </p:timing>
+</p:sld>
+</file>
+
+<file path=ppt/slides/slide7.xml><?xml version="1.0" encoding="utf-8"?>
+<p:sld xmlns:a="http://schemas.openxmlformats.org/drawingml/2006/main" xmlns:r="http://schemas.openxmlformats.org/officeDocument/2006/relationships" xmlns:p="http://schemas.openxmlformats.org/presentationml/2006/main">
+  <p:cSld>
+    <p:spTree>
+      <p:nvGrpSpPr>
+        <p:cNvPr id="1" name=""/>
+        <p:cNvGrpSpPr/>
+        <p:nvPr/>
+      </p:nvGrpSpPr>
+      <p:grpSpPr>
+        <a:xfrm>
+          <a:off x="0" y="0"/>
+          <a:ext cx="0" cy="0"/>
+          <a:chOff x="0" y="0"/>
+          <a:chExt cx="0" cy="0"/>
+        </a:xfrm>
+      </p:grpSpPr>
+      <p:sp>
+        <p:nvSpPr>
+          <p:cNvPr id="2" name="Titel 1"/>
+          <p:cNvSpPr>
+            <a:spLocks noGrp="1"/>
+          </p:cNvSpPr>
+          <p:nvPr>
+            <p:ph type="title"/>
+          </p:nvPr>
+        </p:nvSpPr>
+        <p:spPr>
+          <a:xfrm>
+            <a:off x="677334" y="640772"/>
+            <a:ext cx="8596668" cy="1320800"/>
+          </a:xfrm>
+        </p:spPr>
+        <p:txBody>
+          <a:bodyPr/>
+          <a:lstStyle/>
+          <a:p>
+            <a:r>
+              <a:rPr lang="de-CH" dirty="0" smtClean="0"/>
+              <a:t>Interface</a:t>
+            </a:r>
+            <a:endParaRPr lang="de-CH" dirty="0"/>
+          </a:p>
+        </p:txBody>
+      </p:sp>
+      <p:sp>
+        <p:nvSpPr>
+          <p:cNvPr id="3" name="Inhaltsplatzhalter 2"/>
+          <p:cNvSpPr>
+            <a:spLocks noGrp="1"/>
+          </p:cNvSpPr>
+          <p:nvPr>
+            <p:ph idx="1"/>
+          </p:nvPr>
+        </p:nvSpPr>
+        <p:spPr/>
+        <p:txBody>
+          <a:bodyPr/>
+          <a:lstStyle/>
+          <a:p>
+            <a:pPr marL="0" indent="0">
+              <a:buNone/>
+            </a:pPr>
+            <a:r>
+              <a:rPr lang="de-CH" dirty="0" err="1">
+                <a:latin typeface="Courier New" pitchFamily="49" charset="0"/>
+                <a:cs typeface="Courier New" pitchFamily="49" charset="0"/>
+              </a:rPr>
+              <a:t>public</a:t>
+            </a:r>
+            <a:r>
+              <a:rPr lang="de-CH" dirty="0">
+                <a:latin typeface="Courier New" pitchFamily="49" charset="0"/>
+                <a:cs typeface="Courier New" pitchFamily="49" charset="0"/>
+              </a:rPr>
+              <a:t> </a:t>
+            </a:r>
+            <a:r>
+              <a:rPr lang="de-CH" dirty="0" err="1">
+                <a:latin typeface="Courier New" pitchFamily="49" charset="0"/>
+                <a:cs typeface="Courier New" pitchFamily="49" charset="0"/>
+              </a:rPr>
+              <a:t>interface</a:t>
+            </a:r>
+            <a:r>
+              <a:rPr lang="de-CH" dirty="0">
+                <a:latin typeface="Courier New" pitchFamily="49" charset="0"/>
+                <a:cs typeface="Courier New" pitchFamily="49" charset="0"/>
+              </a:rPr>
+              <a:t> </a:t>
+            </a:r>
+            <a:r>
+              <a:rPr lang="de-CH" dirty="0" err="1">
+                <a:latin typeface="Courier New" pitchFamily="49" charset="0"/>
+                <a:cs typeface="Courier New" pitchFamily="49" charset="0"/>
+              </a:rPr>
+              <a:t>IGericht</a:t>
+            </a:r>
+            <a:r>
+              <a:rPr lang="de-CH" dirty="0">
+                <a:latin typeface="Courier New" pitchFamily="49" charset="0"/>
+                <a:cs typeface="Courier New" pitchFamily="49" charset="0"/>
+              </a:rPr>
+              <a:t> { </a:t>
+            </a:r>
+            <a:br>
+              <a:rPr lang="de-CH" dirty="0">
+                <a:latin typeface="Courier New" pitchFamily="49" charset="0"/>
+                <a:cs typeface="Courier New" pitchFamily="49" charset="0"/>
+              </a:rPr>
+            </a:br>
+            <a:r>
+              <a:rPr lang="de-CH" dirty="0">
+                <a:latin typeface="Courier New" pitchFamily="49" charset="0"/>
+                <a:cs typeface="Courier New" pitchFamily="49" charset="0"/>
+              </a:rPr>
+              <a:t>    </a:t>
+            </a:r>
+            <a:r>
+              <a:rPr lang="de-CH" dirty="0" err="1">
+                <a:latin typeface="Courier New" pitchFamily="49" charset="0"/>
+                <a:cs typeface="Courier New" pitchFamily="49" charset="0"/>
+              </a:rPr>
+              <a:t>public</a:t>
+            </a:r>
+            <a:r>
+              <a:rPr lang="de-CH" dirty="0">
+                <a:latin typeface="Courier New" pitchFamily="49" charset="0"/>
+                <a:cs typeface="Courier New" pitchFamily="49" charset="0"/>
+              </a:rPr>
+              <a:t> double </a:t>
+            </a:r>
+            <a:r>
+              <a:rPr lang="de-CH" dirty="0" err="1">
+                <a:latin typeface="Courier New" pitchFamily="49" charset="0"/>
+                <a:cs typeface="Courier New" pitchFamily="49" charset="0"/>
+              </a:rPr>
+              <a:t>getPreis</a:t>
+            </a:r>
+            <a:r>
+              <a:rPr lang="de-CH" dirty="0">
+                <a:latin typeface="Courier New" pitchFamily="49" charset="0"/>
+                <a:cs typeface="Courier New" pitchFamily="49" charset="0"/>
+              </a:rPr>
+              <a:t>(); </a:t>
+            </a:r>
+            <a:br>
+              <a:rPr lang="de-CH" dirty="0">
+                <a:latin typeface="Courier New" pitchFamily="49" charset="0"/>
+                <a:cs typeface="Courier New" pitchFamily="49" charset="0"/>
+              </a:rPr>
+            </a:br>
+            <a:r>
+              <a:rPr lang="de-CH" dirty="0">
+                <a:latin typeface="Courier New" pitchFamily="49" charset="0"/>
+                <a:cs typeface="Courier New" pitchFamily="49" charset="0"/>
+              </a:rPr>
+              <a:t>    </a:t>
+            </a:r>
+            <a:r>
+              <a:rPr lang="de-CH" dirty="0" err="1">
+                <a:latin typeface="Courier New" pitchFamily="49" charset="0"/>
+                <a:cs typeface="Courier New" pitchFamily="49" charset="0"/>
+              </a:rPr>
+              <a:t>public</a:t>
+            </a:r>
+            <a:r>
+              <a:rPr lang="de-CH" dirty="0">
+                <a:latin typeface="Courier New" pitchFamily="49" charset="0"/>
+                <a:cs typeface="Courier New" pitchFamily="49" charset="0"/>
+              </a:rPr>
+              <a:t> </a:t>
+            </a:r>
+            <a:r>
+              <a:rPr lang="de-CH" dirty="0" err="1">
+                <a:latin typeface="Courier New" pitchFamily="49" charset="0"/>
+                <a:cs typeface="Courier New" pitchFamily="49" charset="0"/>
+              </a:rPr>
+              <a:t>void</a:t>
+            </a:r>
+            <a:r>
+              <a:rPr lang="de-CH" dirty="0">
+                <a:latin typeface="Courier New" pitchFamily="49" charset="0"/>
+                <a:cs typeface="Courier New" pitchFamily="49" charset="0"/>
+              </a:rPr>
+              <a:t> </a:t>
+            </a:r>
+            <a:r>
+              <a:rPr lang="de-CH" dirty="0" err="1">
+                <a:latin typeface="Courier New" pitchFamily="49" charset="0"/>
+                <a:cs typeface="Courier New" pitchFamily="49" charset="0"/>
+              </a:rPr>
+              <a:t>druckeBeschreibung</a:t>
+            </a:r>
+            <a:r>
+              <a:rPr lang="de-CH" dirty="0">
+                <a:latin typeface="Courier New" pitchFamily="49" charset="0"/>
+                <a:cs typeface="Courier New" pitchFamily="49" charset="0"/>
+              </a:rPr>
+              <a:t>(); </a:t>
+            </a:r>
+            <a:br>
+              <a:rPr lang="de-CH" dirty="0">
+                <a:latin typeface="Courier New" pitchFamily="49" charset="0"/>
+                <a:cs typeface="Courier New" pitchFamily="49" charset="0"/>
+              </a:rPr>
+            </a:br>
+            <a:r>
+              <a:rPr lang="de-CH" dirty="0">
+                <a:latin typeface="Courier New" pitchFamily="49" charset="0"/>
+                <a:cs typeface="Courier New" pitchFamily="49" charset="0"/>
+              </a:rPr>
+              <a:t>}  </a:t>
+            </a:r>
+            <a:endParaRPr lang="de-CH" dirty="0" smtClean="0">
+              <a:latin typeface="Courier New" pitchFamily="49" charset="0"/>
+              <a:cs typeface="Courier New" pitchFamily="49" charset="0"/>
+            </a:endParaRPr>
+          </a:p>
+        </p:txBody>
+      </p:sp>
+    </p:spTree>
+    <p:extLst>
+      <p:ext uri="{BB962C8B-B14F-4D97-AF65-F5344CB8AC3E}">
+        <p14:creationId xmlns:p14="http://schemas.microsoft.com/office/powerpoint/2010/main" val="1062536718"/>
+      </p:ext>
+    </p:extLst>
+  </p:cSld>
+  <p:clrMapOvr>
+    <a:masterClrMapping/>
+  </p:clrMapOvr>
+  <p:timing>
+    <p:tnLst>
+      <p:par>
+        <p:cTn id="1" dur="indefinite" restart="never" nodeType="tmRoot"/>
+      </p:par>
+    </p:tnLst>
+  </p:timing>
+</p:sld>
+</file>
+
+<file path=ppt/slides/slide8.xml><?xml version="1.0" encoding="utf-8"?>
+<p:sld xmlns:a="http://schemas.openxmlformats.org/drawingml/2006/main" xmlns:r="http://schemas.openxmlformats.org/officeDocument/2006/relationships" xmlns:p="http://schemas.openxmlformats.org/presentationml/2006/main">
+  <p:cSld>
+    <p:spTree>
+      <p:nvGrpSpPr>
+        <p:cNvPr id="1" name=""/>
+        <p:cNvGrpSpPr/>
+        <p:nvPr/>
+      </p:nvGrpSpPr>
+      <p:grpSpPr>
+        <a:xfrm>
+          <a:off x="0" y="0"/>
+          <a:ext cx="0" cy="0"/>
+          <a:chOff x="0" y="0"/>
+          <a:chExt cx="0" cy="0"/>
+        </a:xfrm>
+      </p:grpSpPr>
+      <p:sp>
+        <p:nvSpPr>
+          <p:cNvPr id="2" name="Titel 1"/>
+          <p:cNvSpPr>
+            <a:spLocks noGrp="1"/>
+          </p:cNvSpPr>
+          <p:nvPr>
+            <p:ph type="title"/>
+          </p:nvPr>
+        </p:nvSpPr>
+        <p:spPr>
+          <a:xfrm>
+            <a:off x="677334" y="640772"/>
+            <a:ext cx="8596668" cy="1320800"/>
+          </a:xfrm>
+        </p:spPr>
+        <p:txBody>
+          <a:bodyPr/>
+          <a:lstStyle/>
+          <a:p>
+            <a:r>
+              <a:rPr lang="de-CH" dirty="0" smtClean="0"/>
+              <a:t>Basisklassen</a:t>
+            </a:r>
+            <a:endParaRPr lang="de-CH" dirty="0"/>
+          </a:p>
+        </p:txBody>
+      </p:sp>
+      <p:sp>
+        <p:nvSpPr>
+          <p:cNvPr id="3" name="Inhaltsplatzhalter 2"/>
+          <p:cNvSpPr>
+            <a:spLocks noGrp="1"/>
+          </p:cNvSpPr>
+          <p:nvPr>
+            <p:ph idx="1"/>
+          </p:nvPr>
+        </p:nvSpPr>
+        <p:spPr>
+          <a:xfrm>
+            <a:off x="677334" y="2026227"/>
+            <a:ext cx="8596668" cy="4015135"/>
+          </a:xfrm>
+        </p:spPr>
+        <p:txBody>
+          <a:bodyPr>
+            <a:normAutofit fontScale="92500" lnSpcReduction="20000"/>
+          </a:bodyPr>
+          <a:lstStyle/>
+          <a:p>
+            <a:pPr marL="0" indent="0">
+              <a:buNone/>
+            </a:pPr>
+            <a:r>
+              <a:rPr lang="de-CH" dirty="0" err="1">
+                <a:latin typeface="Courier New" pitchFamily="49" charset="0"/>
+                <a:cs typeface="Courier New" pitchFamily="49" charset="0"/>
+              </a:rPr>
+              <a:t>class</a:t>
+            </a:r>
+            <a:r>
+              <a:rPr lang="de-CH" dirty="0">
+                <a:latin typeface="Courier New" pitchFamily="49" charset="0"/>
+                <a:cs typeface="Courier New" pitchFamily="49" charset="0"/>
+              </a:rPr>
+              <a:t> </a:t>
+            </a:r>
+            <a:r>
+              <a:rPr lang="de-CH" dirty="0" err="1">
+                <a:latin typeface="Courier New" pitchFamily="49" charset="0"/>
+                <a:cs typeface="Courier New" pitchFamily="49" charset="0"/>
+              </a:rPr>
+              <a:t>Hueftsteak</a:t>
+            </a:r>
+            <a:r>
+              <a:rPr lang="de-CH" dirty="0">
+                <a:latin typeface="Courier New" pitchFamily="49" charset="0"/>
+                <a:cs typeface="Courier New" pitchFamily="49" charset="0"/>
+              </a:rPr>
+              <a:t> </a:t>
+            </a:r>
+            <a:r>
+              <a:rPr lang="de-CH" dirty="0" err="1">
+                <a:latin typeface="Courier New" pitchFamily="49" charset="0"/>
+                <a:cs typeface="Courier New" pitchFamily="49" charset="0"/>
+              </a:rPr>
+              <a:t>implements</a:t>
+            </a:r>
+            <a:r>
+              <a:rPr lang="de-CH" dirty="0">
+                <a:latin typeface="Courier New" pitchFamily="49" charset="0"/>
+                <a:cs typeface="Courier New" pitchFamily="49" charset="0"/>
+              </a:rPr>
+              <a:t> </a:t>
+            </a:r>
+            <a:r>
+              <a:rPr lang="de-CH" dirty="0" err="1">
+                <a:latin typeface="Courier New" pitchFamily="49" charset="0"/>
+                <a:cs typeface="Courier New" pitchFamily="49" charset="0"/>
+              </a:rPr>
+              <a:t>IGericht</a:t>
+            </a:r>
+            <a:r>
+              <a:rPr lang="de-CH" dirty="0">
+                <a:latin typeface="Courier New" pitchFamily="49" charset="0"/>
+                <a:cs typeface="Courier New" pitchFamily="49" charset="0"/>
+              </a:rPr>
+              <a:t> { </a:t>
+            </a:r>
+            <a:br>
+              <a:rPr lang="de-CH" dirty="0">
+                <a:latin typeface="Courier New" pitchFamily="49" charset="0"/>
+                <a:cs typeface="Courier New" pitchFamily="49" charset="0"/>
+              </a:rPr>
+            </a:br>
+            <a:r>
+              <a:rPr lang="de-CH" dirty="0">
+                <a:latin typeface="Courier New" pitchFamily="49" charset="0"/>
+                <a:cs typeface="Courier New" pitchFamily="49" charset="0"/>
+              </a:rPr>
+              <a:t>    </a:t>
+            </a:r>
+            <a:r>
+              <a:rPr lang="de-CH" dirty="0" err="1">
+                <a:latin typeface="Courier New" pitchFamily="49" charset="0"/>
+                <a:cs typeface="Courier New" pitchFamily="49" charset="0"/>
+              </a:rPr>
+              <a:t>public</a:t>
+            </a:r>
+            <a:r>
+              <a:rPr lang="de-CH" dirty="0">
+                <a:latin typeface="Courier New" pitchFamily="49" charset="0"/>
+                <a:cs typeface="Courier New" pitchFamily="49" charset="0"/>
+              </a:rPr>
+              <a:t> </a:t>
+            </a:r>
+            <a:r>
+              <a:rPr lang="de-CH" dirty="0" err="1">
+                <a:latin typeface="Courier New" pitchFamily="49" charset="0"/>
+                <a:cs typeface="Courier New" pitchFamily="49" charset="0"/>
+              </a:rPr>
+              <a:t>void</a:t>
+            </a:r>
+            <a:r>
+              <a:rPr lang="de-CH" dirty="0">
+                <a:latin typeface="Courier New" pitchFamily="49" charset="0"/>
+                <a:cs typeface="Courier New" pitchFamily="49" charset="0"/>
+              </a:rPr>
+              <a:t> </a:t>
+            </a:r>
+            <a:r>
+              <a:rPr lang="de-CH" dirty="0" err="1">
+                <a:latin typeface="Courier New" pitchFamily="49" charset="0"/>
+                <a:cs typeface="Courier New" pitchFamily="49" charset="0"/>
+              </a:rPr>
+              <a:t>druckeBeschreibung</a:t>
+            </a:r>
+            <a:r>
+              <a:rPr lang="de-CH" dirty="0">
+                <a:latin typeface="Courier New" pitchFamily="49" charset="0"/>
+                <a:cs typeface="Courier New" pitchFamily="49" charset="0"/>
+              </a:rPr>
+              <a:t>() { </a:t>
+            </a:r>
+            <a:br>
+              <a:rPr lang="de-CH" dirty="0">
+                <a:latin typeface="Courier New" pitchFamily="49" charset="0"/>
+                <a:cs typeface="Courier New" pitchFamily="49" charset="0"/>
+              </a:rPr>
+            </a:br>
+            <a:r>
+              <a:rPr lang="de-CH" dirty="0">
+                <a:latin typeface="Courier New" pitchFamily="49" charset="0"/>
+                <a:cs typeface="Courier New" pitchFamily="49" charset="0"/>
+              </a:rPr>
+              <a:t>        </a:t>
+            </a:r>
+            <a:r>
+              <a:rPr lang="de-CH" dirty="0" err="1">
+                <a:latin typeface="Courier New" pitchFamily="49" charset="0"/>
+                <a:cs typeface="Courier New" pitchFamily="49" charset="0"/>
+              </a:rPr>
+              <a:t>System.out.print</a:t>
+            </a:r>
+            <a:r>
+              <a:rPr lang="de-CH" dirty="0">
+                <a:latin typeface="Courier New" pitchFamily="49" charset="0"/>
+                <a:cs typeface="Courier New" pitchFamily="49" charset="0"/>
+              </a:rPr>
+              <a:t>("Hüftsteak"); </a:t>
+            </a:r>
+            <a:br>
+              <a:rPr lang="de-CH" dirty="0">
+                <a:latin typeface="Courier New" pitchFamily="49" charset="0"/>
+                <a:cs typeface="Courier New" pitchFamily="49" charset="0"/>
+              </a:rPr>
+            </a:br>
+            <a:r>
+              <a:rPr lang="de-CH" dirty="0">
+                <a:latin typeface="Courier New" pitchFamily="49" charset="0"/>
+                <a:cs typeface="Courier New" pitchFamily="49" charset="0"/>
+              </a:rPr>
+              <a:t>    } </a:t>
+            </a:r>
+            <a:br>
+              <a:rPr lang="de-CH" dirty="0">
+                <a:latin typeface="Courier New" pitchFamily="49" charset="0"/>
+                <a:cs typeface="Courier New" pitchFamily="49" charset="0"/>
+              </a:rPr>
+            </a:br>
+            <a:r>
+              <a:rPr lang="de-CH" dirty="0">
+                <a:latin typeface="Courier New" pitchFamily="49" charset="0"/>
+                <a:cs typeface="Courier New" pitchFamily="49" charset="0"/>
+              </a:rPr>
+              <a:t>    </a:t>
+            </a:r>
+            <a:r>
+              <a:rPr lang="de-CH" dirty="0" err="1">
+                <a:latin typeface="Courier New" pitchFamily="49" charset="0"/>
+                <a:cs typeface="Courier New" pitchFamily="49" charset="0"/>
+              </a:rPr>
+              <a:t>public</a:t>
+            </a:r>
+            <a:r>
+              <a:rPr lang="de-CH" dirty="0">
+                <a:latin typeface="Courier New" pitchFamily="49" charset="0"/>
+                <a:cs typeface="Courier New" pitchFamily="49" charset="0"/>
+              </a:rPr>
+              <a:t> double </a:t>
+            </a:r>
+            <a:r>
+              <a:rPr lang="de-CH" dirty="0" err="1">
+                <a:latin typeface="Courier New" pitchFamily="49" charset="0"/>
+                <a:cs typeface="Courier New" pitchFamily="49" charset="0"/>
+              </a:rPr>
+              <a:t>getPreis</a:t>
+            </a:r>
+            <a:r>
+              <a:rPr lang="de-CH" dirty="0">
+                <a:latin typeface="Courier New" pitchFamily="49" charset="0"/>
+                <a:cs typeface="Courier New" pitchFamily="49" charset="0"/>
+              </a:rPr>
+              <a:t>() { </a:t>
+            </a:r>
+            <a:br>
+              <a:rPr lang="de-CH" dirty="0">
+                <a:latin typeface="Courier New" pitchFamily="49" charset="0"/>
+                <a:cs typeface="Courier New" pitchFamily="49" charset="0"/>
+              </a:rPr>
+            </a:br>
+            <a:r>
+              <a:rPr lang="de-CH" dirty="0">
+                <a:latin typeface="Courier New" pitchFamily="49" charset="0"/>
+                <a:cs typeface="Courier New" pitchFamily="49" charset="0"/>
+              </a:rPr>
+              <a:t>        </a:t>
+            </a:r>
+            <a:r>
+              <a:rPr lang="de-CH" dirty="0" err="1">
+                <a:latin typeface="Courier New" pitchFamily="49" charset="0"/>
+                <a:cs typeface="Courier New" pitchFamily="49" charset="0"/>
+              </a:rPr>
+              <a:t>return</a:t>
+            </a:r>
+            <a:r>
+              <a:rPr lang="de-CH" dirty="0">
+                <a:latin typeface="Courier New" pitchFamily="49" charset="0"/>
+                <a:cs typeface="Courier New" pitchFamily="49" charset="0"/>
+              </a:rPr>
+              <a:t> 13.0; </a:t>
+            </a:r>
+            <a:br>
+              <a:rPr lang="de-CH" dirty="0">
+                <a:latin typeface="Courier New" pitchFamily="49" charset="0"/>
+                <a:cs typeface="Courier New" pitchFamily="49" charset="0"/>
+              </a:rPr>
+            </a:br>
+            <a:r>
+              <a:rPr lang="de-CH" dirty="0">
+                <a:latin typeface="Courier New" pitchFamily="49" charset="0"/>
+                <a:cs typeface="Courier New" pitchFamily="49" charset="0"/>
+              </a:rPr>
+              <a:t>    } </a:t>
+            </a:r>
+            <a:br>
+              <a:rPr lang="de-CH" dirty="0">
+                <a:latin typeface="Courier New" pitchFamily="49" charset="0"/>
+                <a:cs typeface="Courier New" pitchFamily="49" charset="0"/>
+              </a:rPr>
+            </a:br>
+            <a:r>
+              <a:rPr lang="de-CH" dirty="0">
+                <a:latin typeface="Courier New" pitchFamily="49" charset="0"/>
+                <a:cs typeface="Courier New" pitchFamily="49" charset="0"/>
+              </a:rPr>
+              <a:t>} </a:t>
+            </a:r>
+            <a:br>
+              <a:rPr lang="de-CH" dirty="0">
+                <a:latin typeface="Courier New" pitchFamily="49" charset="0"/>
+                <a:cs typeface="Courier New" pitchFamily="49" charset="0"/>
+              </a:rPr>
+            </a:br>
+            <a:r>
+              <a:rPr lang="de-CH" dirty="0">
+                <a:latin typeface="Courier New" pitchFamily="49" charset="0"/>
+                <a:cs typeface="Courier New" pitchFamily="49" charset="0"/>
+              </a:rPr>
+              <a:t/>
+            </a:r>
+            <a:br>
+              <a:rPr lang="de-CH" dirty="0">
+                <a:latin typeface="Courier New" pitchFamily="49" charset="0"/>
+                <a:cs typeface="Courier New" pitchFamily="49" charset="0"/>
+              </a:rPr>
+            </a:br>
+            <a:r>
+              <a:rPr lang="de-CH" dirty="0">
+                <a:latin typeface="Courier New" pitchFamily="49" charset="0"/>
+                <a:cs typeface="Courier New" pitchFamily="49" charset="0"/>
+              </a:rPr>
+              <a:t/>
+            </a:r>
+            <a:br>
+              <a:rPr lang="de-CH" dirty="0">
+                <a:latin typeface="Courier New" pitchFamily="49" charset="0"/>
+                <a:cs typeface="Courier New" pitchFamily="49" charset="0"/>
+              </a:rPr>
+            </a:br>
+            <a:r>
+              <a:rPr lang="de-CH" dirty="0" err="1">
+                <a:latin typeface="Courier New" pitchFamily="49" charset="0"/>
+                <a:cs typeface="Courier New" pitchFamily="49" charset="0"/>
+              </a:rPr>
+              <a:t>class</a:t>
+            </a:r>
+            <a:r>
+              <a:rPr lang="de-CH" dirty="0">
+                <a:latin typeface="Courier New" pitchFamily="49" charset="0"/>
+                <a:cs typeface="Courier New" pitchFamily="49" charset="0"/>
+              </a:rPr>
+              <a:t> Tofu </a:t>
+            </a:r>
+            <a:r>
+              <a:rPr lang="de-CH" dirty="0" err="1">
+                <a:latin typeface="Courier New" pitchFamily="49" charset="0"/>
+                <a:cs typeface="Courier New" pitchFamily="49" charset="0"/>
+              </a:rPr>
+              <a:t>implements</a:t>
+            </a:r>
+            <a:r>
+              <a:rPr lang="de-CH" dirty="0">
+                <a:latin typeface="Courier New" pitchFamily="49" charset="0"/>
+                <a:cs typeface="Courier New" pitchFamily="49" charset="0"/>
+              </a:rPr>
+              <a:t> </a:t>
+            </a:r>
+            <a:r>
+              <a:rPr lang="de-CH" dirty="0" err="1">
+                <a:latin typeface="Courier New" pitchFamily="49" charset="0"/>
+                <a:cs typeface="Courier New" pitchFamily="49" charset="0"/>
+              </a:rPr>
+              <a:t>IGericht</a:t>
+            </a:r>
+            <a:r>
+              <a:rPr lang="de-CH" dirty="0">
+                <a:latin typeface="Courier New" pitchFamily="49" charset="0"/>
+                <a:cs typeface="Courier New" pitchFamily="49" charset="0"/>
+              </a:rPr>
+              <a:t> { </a:t>
+            </a:r>
+            <a:br>
+              <a:rPr lang="de-CH" dirty="0">
+                <a:latin typeface="Courier New" pitchFamily="49" charset="0"/>
+                <a:cs typeface="Courier New" pitchFamily="49" charset="0"/>
+              </a:rPr>
+            </a:br>
+            <a:r>
+              <a:rPr lang="de-CH" dirty="0">
+                <a:latin typeface="Courier New" pitchFamily="49" charset="0"/>
+                <a:cs typeface="Courier New" pitchFamily="49" charset="0"/>
+              </a:rPr>
+              <a:t>    </a:t>
+            </a:r>
+            <a:r>
+              <a:rPr lang="de-CH" dirty="0" err="1">
+                <a:latin typeface="Courier New" pitchFamily="49" charset="0"/>
+                <a:cs typeface="Courier New" pitchFamily="49" charset="0"/>
+              </a:rPr>
+              <a:t>public</a:t>
+            </a:r>
+            <a:r>
+              <a:rPr lang="de-CH" dirty="0">
+                <a:latin typeface="Courier New" pitchFamily="49" charset="0"/>
+                <a:cs typeface="Courier New" pitchFamily="49" charset="0"/>
+              </a:rPr>
+              <a:t> </a:t>
+            </a:r>
+            <a:r>
+              <a:rPr lang="de-CH" dirty="0" err="1">
+                <a:latin typeface="Courier New" pitchFamily="49" charset="0"/>
+                <a:cs typeface="Courier New" pitchFamily="49" charset="0"/>
+              </a:rPr>
+              <a:t>void</a:t>
+            </a:r>
+            <a:r>
+              <a:rPr lang="de-CH" dirty="0">
+                <a:latin typeface="Courier New" pitchFamily="49" charset="0"/>
+                <a:cs typeface="Courier New" pitchFamily="49" charset="0"/>
+              </a:rPr>
+              <a:t> </a:t>
+            </a:r>
+            <a:r>
+              <a:rPr lang="de-CH" dirty="0" err="1">
+                <a:latin typeface="Courier New" pitchFamily="49" charset="0"/>
+                <a:cs typeface="Courier New" pitchFamily="49" charset="0"/>
+              </a:rPr>
+              <a:t>druckeBeschreibung</a:t>
+            </a:r>
+            <a:r>
+              <a:rPr lang="de-CH" dirty="0">
+                <a:latin typeface="Courier New" pitchFamily="49" charset="0"/>
+                <a:cs typeface="Courier New" pitchFamily="49" charset="0"/>
+              </a:rPr>
+              <a:t>() { </a:t>
+            </a:r>
+            <a:br>
+              <a:rPr lang="de-CH" dirty="0">
+                <a:latin typeface="Courier New" pitchFamily="49" charset="0"/>
+                <a:cs typeface="Courier New" pitchFamily="49" charset="0"/>
+              </a:rPr>
+            </a:br>
+            <a:r>
+              <a:rPr lang="de-CH" dirty="0">
+                <a:latin typeface="Courier New" pitchFamily="49" charset="0"/>
+                <a:cs typeface="Courier New" pitchFamily="49" charset="0"/>
+              </a:rPr>
+              <a:t>        </a:t>
+            </a:r>
+            <a:r>
+              <a:rPr lang="de-CH" dirty="0" err="1">
+                <a:latin typeface="Courier New" pitchFamily="49" charset="0"/>
+                <a:cs typeface="Courier New" pitchFamily="49" charset="0"/>
+              </a:rPr>
+              <a:t>System.out.print</a:t>
+            </a:r>
+            <a:r>
+              <a:rPr lang="de-CH" dirty="0">
+                <a:latin typeface="Courier New" pitchFamily="49" charset="0"/>
+                <a:cs typeface="Courier New" pitchFamily="49" charset="0"/>
+              </a:rPr>
+              <a:t>("Tofu"); </a:t>
+            </a:r>
+            <a:br>
+              <a:rPr lang="de-CH" dirty="0">
+                <a:latin typeface="Courier New" pitchFamily="49" charset="0"/>
+                <a:cs typeface="Courier New" pitchFamily="49" charset="0"/>
+              </a:rPr>
+            </a:br>
+            <a:r>
+              <a:rPr lang="de-CH" dirty="0">
+                <a:latin typeface="Courier New" pitchFamily="49" charset="0"/>
+                <a:cs typeface="Courier New" pitchFamily="49" charset="0"/>
+              </a:rPr>
+              <a:t>    } </a:t>
+            </a:r>
+            <a:br>
+              <a:rPr lang="de-CH" dirty="0">
+                <a:latin typeface="Courier New" pitchFamily="49" charset="0"/>
+                <a:cs typeface="Courier New" pitchFamily="49" charset="0"/>
+              </a:rPr>
+            </a:br>
+            <a:r>
+              <a:rPr lang="de-CH" dirty="0">
+                <a:latin typeface="Courier New" pitchFamily="49" charset="0"/>
+                <a:cs typeface="Courier New" pitchFamily="49" charset="0"/>
+              </a:rPr>
+              <a:t>    </a:t>
+            </a:r>
+            <a:r>
+              <a:rPr lang="de-CH" dirty="0" err="1">
+                <a:latin typeface="Courier New" pitchFamily="49" charset="0"/>
+                <a:cs typeface="Courier New" pitchFamily="49" charset="0"/>
+              </a:rPr>
+              <a:t>public</a:t>
+            </a:r>
+            <a:r>
+              <a:rPr lang="de-CH" dirty="0">
+                <a:latin typeface="Courier New" pitchFamily="49" charset="0"/>
+                <a:cs typeface="Courier New" pitchFamily="49" charset="0"/>
+              </a:rPr>
+              <a:t> double </a:t>
+            </a:r>
+            <a:r>
+              <a:rPr lang="de-CH" dirty="0" err="1">
+                <a:latin typeface="Courier New" pitchFamily="49" charset="0"/>
+                <a:cs typeface="Courier New" pitchFamily="49" charset="0"/>
+              </a:rPr>
+              <a:t>getPreis</a:t>
+            </a:r>
+            <a:r>
+              <a:rPr lang="de-CH" dirty="0">
+                <a:latin typeface="Courier New" pitchFamily="49" charset="0"/>
+                <a:cs typeface="Courier New" pitchFamily="49" charset="0"/>
+              </a:rPr>
+              <a:t>() { </a:t>
+            </a:r>
+            <a:br>
+              <a:rPr lang="de-CH" dirty="0">
+                <a:latin typeface="Courier New" pitchFamily="49" charset="0"/>
+                <a:cs typeface="Courier New" pitchFamily="49" charset="0"/>
+              </a:rPr>
+            </a:br>
+            <a:r>
+              <a:rPr lang="de-CH" dirty="0">
+                <a:latin typeface="Courier New" pitchFamily="49" charset="0"/>
+                <a:cs typeface="Courier New" pitchFamily="49" charset="0"/>
+              </a:rPr>
+              <a:t>        </a:t>
+            </a:r>
+            <a:r>
+              <a:rPr lang="de-CH" dirty="0" err="1">
+                <a:latin typeface="Courier New" pitchFamily="49" charset="0"/>
+                <a:cs typeface="Courier New" pitchFamily="49" charset="0"/>
+              </a:rPr>
+              <a:t>return</a:t>
+            </a:r>
+            <a:r>
+              <a:rPr lang="de-CH" dirty="0">
+                <a:latin typeface="Courier New" pitchFamily="49" charset="0"/>
+                <a:cs typeface="Courier New" pitchFamily="49" charset="0"/>
+              </a:rPr>
+              <a:t> 8.50; </a:t>
+            </a:r>
+            <a:br>
+              <a:rPr lang="de-CH" dirty="0">
+                <a:latin typeface="Courier New" pitchFamily="49" charset="0"/>
+                <a:cs typeface="Courier New" pitchFamily="49" charset="0"/>
+              </a:rPr>
+            </a:br>
+            <a:r>
+              <a:rPr lang="de-CH" dirty="0">
+                <a:latin typeface="Courier New" pitchFamily="49" charset="0"/>
+                <a:cs typeface="Courier New" pitchFamily="49" charset="0"/>
+              </a:rPr>
+              <a:t>    } </a:t>
+            </a:r>
+            <a:br>
+              <a:rPr lang="de-CH" dirty="0">
+                <a:latin typeface="Courier New" pitchFamily="49" charset="0"/>
+                <a:cs typeface="Courier New" pitchFamily="49" charset="0"/>
+              </a:rPr>
+            </a:br>
+            <a:r>
+              <a:rPr lang="de-CH" dirty="0">
+                <a:latin typeface="Courier New" pitchFamily="49" charset="0"/>
+                <a:cs typeface="Courier New" pitchFamily="49" charset="0"/>
+              </a:rPr>
+              <a:t>} </a:t>
+            </a:r>
+            <a:endParaRPr lang="de-CH" dirty="0" smtClean="0">
+              <a:latin typeface="Courier New" pitchFamily="49" charset="0"/>
+              <a:cs typeface="Courier New" pitchFamily="49" charset="0"/>
+            </a:endParaRPr>
+          </a:p>
+        </p:txBody>
+      </p:sp>
+    </p:spTree>
+    <p:extLst>
+      <p:ext uri="{BB962C8B-B14F-4D97-AF65-F5344CB8AC3E}">
+        <p14:creationId xmlns:p14="http://schemas.microsoft.com/office/powerpoint/2010/main" val="3243062611"/>
+      </p:ext>
+    </p:extLst>
+  </p:cSld>
+  <p:clrMapOvr>
+    <a:masterClrMapping/>
+  </p:clrMapOvr>
+  <p:timing>
+    <p:tnLst>
+      <p:par>
+        <p:cTn id="1" dur="indefinite" restart="never" nodeType="tmRoot"/>
+      </p:par>
+    </p:tnLst>
+  </p:timing>
+</p:sld>
+</file>
+
+<file path=ppt/slides/slide9.xml><?xml version="1.0" encoding="utf-8"?>
+<p:sld xmlns:a="http://schemas.openxmlformats.org/drawingml/2006/main" xmlns:r="http://schemas.openxmlformats.org/officeDocument/2006/relationships" xmlns:p="http://schemas.openxmlformats.org/presentationml/2006/main">
+  <p:cSld>
+    <p:spTree>
+      <p:nvGrpSpPr>
+        <p:cNvPr id="1" name=""/>
+        <p:cNvGrpSpPr/>
+        <p:nvPr/>
+      </p:nvGrpSpPr>
+      <p:grpSpPr>
+        <a:xfrm>
+          <a:off x="0" y="0"/>
+          <a:ext cx="0" cy="0"/>
+          <a:chOff x="0" y="0"/>
+          <a:chExt cx="0" cy="0"/>
+        </a:xfrm>
+      </p:grpSpPr>
+      <p:sp>
+        <p:nvSpPr>
+          <p:cNvPr id="2" name="Titel 1"/>
+          <p:cNvSpPr>
+            <a:spLocks noGrp="1"/>
+          </p:cNvSpPr>
+          <p:nvPr>
+            <p:ph type="title"/>
+          </p:nvPr>
+        </p:nvSpPr>
+        <p:spPr>
+          <a:xfrm>
+            <a:off x="677334" y="640772"/>
+            <a:ext cx="8596668" cy="1320800"/>
+          </a:xfrm>
+        </p:spPr>
+        <p:txBody>
+          <a:bodyPr/>
+          <a:lstStyle/>
+          <a:p>
+            <a:r>
+              <a:rPr lang="de-CH" dirty="0" smtClean="0"/>
+              <a:t>Abstrakte Beilage</a:t>
+            </a:r>
+            <a:endParaRPr lang="de-CH" dirty="0"/>
+          </a:p>
+        </p:txBody>
+      </p:sp>
+      <p:sp>
+        <p:nvSpPr>
+          <p:cNvPr id="3" name="Inhaltsplatzhalter 2"/>
+          <p:cNvSpPr>
+            <a:spLocks noGrp="1"/>
+          </p:cNvSpPr>
+          <p:nvPr>
+            <p:ph idx="1"/>
+          </p:nvPr>
+        </p:nvSpPr>
+        <p:spPr>
+          <a:xfrm>
+            <a:off x="677334" y="2026227"/>
+            <a:ext cx="8596668" cy="4015135"/>
+          </a:xfrm>
+        </p:spPr>
+        <p:txBody>
+          <a:bodyPr>
+            <a:normAutofit/>
+          </a:bodyPr>
+          <a:lstStyle/>
+          <a:p>
+            <a:pPr marL="0" indent="0">
+              <a:buNone/>
+            </a:pPr>
+            <a:r>
+              <a:rPr lang="de-CH" dirty="0" err="1">
+                <a:latin typeface="Courier New" pitchFamily="49" charset="0"/>
+                <a:cs typeface="Courier New" pitchFamily="49" charset="0"/>
+              </a:rPr>
+              <a:t>public</a:t>
+            </a:r>
+            <a:r>
+              <a:rPr lang="de-CH" dirty="0">
+                <a:latin typeface="Courier New" pitchFamily="49" charset="0"/>
+                <a:cs typeface="Courier New" pitchFamily="49" charset="0"/>
+              </a:rPr>
+              <a:t> </a:t>
+            </a:r>
+            <a:r>
+              <a:rPr lang="de-CH" dirty="0" err="1">
+                <a:latin typeface="Courier New" pitchFamily="49" charset="0"/>
+                <a:cs typeface="Courier New" pitchFamily="49" charset="0"/>
+              </a:rPr>
+              <a:t>abstract</a:t>
+            </a:r>
+            <a:r>
+              <a:rPr lang="de-CH" dirty="0">
+                <a:latin typeface="Courier New" pitchFamily="49" charset="0"/>
+                <a:cs typeface="Courier New" pitchFamily="49" charset="0"/>
+              </a:rPr>
+              <a:t> </a:t>
+            </a:r>
+            <a:r>
+              <a:rPr lang="de-CH" dirty="0" err="1">
+                <a:latin typeface="Courier New" pitchFamily="49" charset="0"/>
+                <a:cs typeface="Courier New" pitchFamily="49" charset="0"/>
+              </a:rPr>
+              <a:t>class</a:t>
+            </a:r>
+            <a:r>
+              <a:rPr lang="de-CH" dirty="0">
+                <a:latin typeface="Courier New" pitchFamily="49" charset="0"/>
+                <a:cs typeface="Courier New" pitchFamily="49" charset="0"/>
+              </a:rPr>
+              <a:t> </a:t>
+            </a:r>
+            <a:r>
+              <a:rPr lang="de-CH" dirty="0" err="1">
+                <a:latin typeface="Courier New" pitchFamily="49" charset="0"/>
+                <a:cs typeface="Courier New" pitchFamily="49" charset="0"/>
+              </a:rPr>
+              <a:t>ABeilage</a:t>
+            </a:r>
+            <a:r>
+              <a:rPr lang="de-CH" dirty="0">
+                <a:latin typeface="Courier New" pitchFamily="49" charset="0"/>
+                <a:cs typeface="Courier New" pitchFamily="49" charset="0"/>
+              </a:rPr>
+              <a:t> </a:t>
+            </a:r>
+            <a:r>
+              <a:rPr lang="de-CH" dirty="0" err="1">
+                <a:latin typeface="Courier New" pitchFamily="49" charset="0"/>
+                <a:cs typeface="Courier New" pitchFamily="49" charset="0"/>
+              </a:rPr>
+              <a:t>implements</a:t>
+            </a:r>
+            <a:r>
+              <a:rPr lang="de-CH" dirty="0">
+                <a:latin typeface="Courier New" pitchFamily="49" charset="0"/>
+                <a:cs typeface="Courier New" pitchFamily="49" charset="0"/>
+              </a:rPr>
+              <a:t> </a:t>
+            </a:r>
+            <a:r>
+              <a:rPr lang="de-CH" dirty="0" err="1">
+                <a:latin typeface="Courier New" pitchFamily="49" charset="0"/>
+                <a:cs typeface="Courier New" pitchFamily="49" charset="0"/>
+              </a:rPr>
+              <a:t>IGericht</a:t>
+            </a:r>
+            <a:r>
+              <a:rPr lang="de-CH" dirty="0">
+                <a:latin typeface="Courier New" pitchFamily="49" charset="0"/>
+                <a:cs typeface="Courier New" pitchFamily="49" charset="0"/>
+              </a:rPr>
+              <a:t> { </a:t>
+            </a:r>
+            <a:br>
+              <a:rPr lang="de-CH" dirty="0">
+                <a:latin typeface="Courier New" pitchFamily="49" charset="0"/>
+                <a:cs typeface="Courier New" pitchFamily="49" charset="0"/>
+              </a:rPr>
+            </a:br>
+            <a:r>
+              <a:rPr lang="de-CH" dirty="0">
+                <a:latin typeface="Courier New" pitchFamily="49" charset="0"/>
+                <a:cs typeface="Courier New" pitchFamily="49" charset="0"/>
+              </a:rPr>
+              <a:t>    </a:t>
+            </a:r>
+            <a:r>
+              <a:rPr lang="de-CH" dirty="0" err="1">
+                <a:latin typeface="Courier New" pitchFamily="49" charset="0"/>
+                <a:cs typeface="Courier New" pitchFamily="49" charset="0"/>
+              </a:rPr>
+              <a:t>protected</a:t>
+            </a:r>
+            <a:r>
+              <a:rPr lang="de-CH" dirty="0">
+                <a:latin typeface="Courier New" pitchFamily="49" charset="0"/>
+                <a:cs typeface="Courier New" pitchFamily="49" charset="0"/>
+              </a:rPr>
+              <a:t> </a:t>
+            </a:r>
+            <a:r>
+              <a:rPr lang="de-CH" dirty="0" err="1">
+                <a:latin typeface="Courier New" pitchFamily="49" charset="0"/>
+                <a:cs typeface="Courier New" pitchFamily="49" charset="0"/>
+              </a:rPr>
+              <a:t>IGericht</a:t>
+            </a:r>
+            <a:r>
+              <a:rPr lang="de-CH" dirty="0">
+                <a:latin typeface="Courier New" pitchFamily="49" charset="0"/>
+                <a:cs typeface="Courier New" pitchFamily="49" charset="0"/>
+              </a:rPr>
+              <a:t> </a:t>
+            </a:r>
+            <a:r>
+              <a:rPr lang="de-CH" dirty="0" err="1">
+                <a:latin typeface="Courier New" pitchFamily="49" charset="0"/>
+                <a:cs typeface="Courier New" pitchFamily="49" charset="0"/>
+              </a:rPr>
+              <a:t>gericht</a:t>
+            </a:r>
+            <a:r>
+              <a:rPr lang="de-CH" dirty="0">
+                <a:latin typeface="Courier New" pitchFamily="49" charset="0"/>
+                <a:cs typeface="Courier New" pitchFamily="49" charset="0"/>
+              </a:rPr>
+              <a:t>; </a:t>
+            </a:r>
+            <a:br>
+              <a:rPr lang="de-CH" dirty="0">
+                <a:latin typeface="Courier New" pitchFamily="49" charset="0"/>
+                <a:cs typeface="Courier New" pitchFamily="49" charset="0"/>
+              </a:rPr>
+            </a:br>
+            <a:r>
+              <a:rPr lang="de-CH" dirty="0">
+                <a:latin typeface="Courier New" pitchFamily="49" charset="0"/>
+                <a:cs typeface="Courier New" pitchFamily="49" charset="0"/>
+              </a:rPr>
+              <a:t/>
+            </a:r>
+            <a:br>
+              <a:rPr lang="de-CH" dirty="0">
+                <a:latin typeface="Courier New" pitchFamily="49" charset="0"/>
+                <a:cs typeface="Courier New" pitchFamily="49" charset="0"/>
+              </a:rPr>
+            </a:br>
+            <a:r>
+              <a:rPr lang="de-CH" dirty="0">
+                <a:latin typeface="Courier New" pitchFamily="49" charset="0"/>
+                <a:cs typeface="Courier New" pitchFamily="49" charset="0"/>
+              </a:rPr>
+              <a:t>    </a:t>
+            </a:r>
+            <a:r>
+              <a:rPr lang="de-CH" dirty="0" err="1">
+                <a:latin typeface="Courier New" pitchFamily="49" charset="0"/>
+                <a:cs typeface="Courier New" pitchFamily="49" charset="0"/>
+              </a:rPr>
+              <a:t>public</a:t>
+            </a:r>
+            <a:r>
+              <a:rPr lang="de-CH" dirty="0">
+                <a:latin typeface="Courier New" pitchFamily="49" charset="0"/>
+                <a:cs typeface="Courier New" pitchFamily="49" charset="0"/>
+              </a:rPr>
+              <a:t> </a:t>
+            </a:r>
+            <a:r>
+              <a:rPr lang="de-CH" dirty="0" err="1">
+                <a:latin typeface="Courier New" pitchFamily="49" charset="0"/>
+                <a:cs typeface="Courier New" pitchFamily="49" charset="0"/>
+              </a:rPr>
+              <a:t>ABeilage</a:t>
+            </a:r>
+            <a:r>
+              <a:rPr lang="de-CH" dirty="0">
+                <a:latin typeface="Courier New" pitchFamily="49" charset="0"/>
+                <a:cs typeface="Courier New" pitchFamily="49" charset="0"/>
+              </a:rPr>
+              <a:t>(</a:t>
+            </a:r>
+            <a:r>
+              <a:rPr lang="de-CH" dirty="0" err="1">
+                <a:latin typeface="Courier New" pitchFamily="49" charset="0"/>
+                <a:cs typeface="Courier New" pitchFamily="49" charset="0"/>
+              </a:rPr>
+              <a:t>IGericht</a:t>
+            </a:r>
+            <a:r>
+              <a:rPr lang="de-CH" dirty="0">
+                <a:latin typeface="Courier New" pitchFamily="49" charset="0"/>
+                <a:cs typeface="Courier New" pitchFamily="49" charset="0"/>
+              </a:rPr>
+              <a:t> </a:t>
+            </a:r>
+            <a:r>
+              <a:rPr lang="de-CH" dirty="0" err="1">
+                <a:latin typeface="Courier New" pitchFamily="49" charset="0"/>
+                <a:cs typeface="Courier New" pitchFamily="49" charset="0"/>
+              </a:rPr>
+              <a:t>pIGericht</a:t>
+            </a:r>
+            <a:r>
+              <a:rPr lang="de-CH" dirty="0">
+                <a:latin typeface="Courier New" pitchFamily="49" charset="0"/>
+                <a:cs typeface="Courier New" pitchFamily="49" charset="0"/>
+              </a:rPr>
+              <a:t>) { </a:t>
+            </a:r>
+            <a:br>
+              <a:rPr lang="de-CH" dirty="0">
+                <a:latin typeface="Courier New" pitchFamily="49" charset="0"/>
+                <a:cs typeface="Courier New" pitchFamily="49" charset="0"/>
+              </a:rPr>
+            </a:br>
+            <a:r>
+              <a:rPr lang="de-CH" dirty="0">
+                <a:latin typeface="Courier New" pitchFamily="49" charset="0"/>
+                <a:cs typeface="Courier New" pitchFamily="49" charset="0"/>
+              </a:rPr>
+              <a:t>        </a:t>
+            </a:r>
+            <a:r>
+              <a:rPr lang="de-CH" dirty="0" err="1">
+                <a:latin typeface="Courier New" pitchFamily="49" charset="0"/>
+                <a:cs typeface="Courier New" pitchFamily="49" charset="0"/>
+              </a:rPr>
+              <a:t>gericht</a:t>
+            </a:r>
+            <a:r>
+              <a:rPr lang="de-CH" dirty="0">
+                <a:latin typeface="Courier New" pitchFamily="49" charset="0"/>
+                <a:cs typeface="Courier New" pitchFamily="49" charset="0"/>
+              </a:rPr>
+              <a:t> = </a:t>
+            </a:r>
+            <a:r>
+              <a:rPr lang="de-CH" dirty="0" err="1">
+                <a:latin typeface="Courier New" pitchFamily="49" charset="0"/>
+                <a:cs typeface="Courier New" pitchFamily="49" charset="0"/>
+              </a:rPr>
+              <a:t>pIGericht</a:t>
+            </a:r>
+            <a:r>
+              <a:rPr lang="de-CH" dirty="0">
+                <a:latin typeface="Courier New" pitchFamily="49" charset="0"/>
+                <a:cs typeface="Courier New" pitchFamily="49" charset="0"/>
+              </a:rPr>
+              <a:t>; </a:t>
+            </a:r>
+            <a:br>
+              <a:rPr lang="de-CH" dirty="0">
+                <a:latin typeface="Courier New" pitchFamily="49" charset="0"/>
+                <a:cs typeface="Courier New" pitchFamily="49" charset="0"/>
+              </a:rPr>
+            </a:br>
+            <a:r>
+              <a:rPr lang="de-CH" dirty="0">
+                <a:latin typeface="Courier New" pitchFamily="49" charset="0"/>
+                <a:cs typeface="Courier New" pitchFamily="49" charset="0"/>
+              </a:rPr>
+              <a:t>    } </a:t>
+            </a:r>
+            <a:br>
+              <a:rPr lang="de-CH" dirty="0">
+                <a:latin typeface="Courier New" pitchFamily="49" charset="0"/>
+                <a:cs typeface="Courier New" pitchFamily="49" charset="0"/>
+              </a:rPr>
+            </a:br>
+            <a:r>
+              <a:rPr lang="de-CH" dirty="0">
+                <a:latin typeface="Courier New" pitchFamily="49" charset="0"/>
+                <a:cs typeface="Courier New" pitchFamily="49" charset="0"/>
+              </a:rPr>
+              <a:t>}  </a:t>
+            </a:r>
+            <a:endParaRPr lang="de-CH" dirty="0" smtClean="0">
+              <a:latin typeface="Courier New" pitchFamily="49" charset="0"/>
+              <a:cs typeface="Courier New" pitchFamily="49" charset="0"/>
+            </a:endParaRPr>
+          </a:p>
+        </p:txBody>
+      </p:sp>
+    </p:spTree>
+    <p:extLst>
+      <p:ext uri="{BB962C8B-B14F-4D97-AF65-F5344CB8AC3E}">
+        <p14:creationId xmlns:p14="http://schemas.microsoft.com/office/powerpoint/2010/main" val="685590224"/>
       </p:ext>
     </p:extLst>
   </p:cSld>

</xml_diff>